<commit_message>
Added settings login page with MVVM architecture.
Signed-off-by: Michael Giannini <michael.giannini@outlook.com>
</commit_message>
<xml_diff>
--- a/Images [Autosaved].pptx
+++ b/Images [Autosaved].pptx
@@ -9,10 +9,14 @@
     <p:sldId id="257" r:id="rId3"/>
     <p:sldId id="258" r:id="rId4"/>
     <p:sldId id="259" r:id="rId5"/>
-    <p:sldId id="260" r:id="rId6"/>
-    <p:sldId id="261" r:id="rId7"/>
-    <p:sldId id="263" r:id="rId8"/>
-    <p:sldId id="262" r:id="rId9"/>
+    <p:sldId id="264" r:id="rId6"/>
+    <p:sldId id="265" r:id="rId7"/>
+    <p:sldId id="266" r:id="rId8"/>
+    <p:sldId id="267" r:id="rId9"/>
+    <p:sldId id="260" r:id="rId10"/>
+    <p:sldId id="261" r:id="rId11"/>
+    <p:sldId id="263" r:id="rId12"/>
+    <p:sldId id="262" r:id="rId13"/>
   </p:sldIdLst>
   <p:sldSz cx="12192000" cy="6858000"/>
   <p:notesSz cx="6858000" cy="9144000"/>
@@ -266,7 +270,7 @@
           <a:p>
             <a:fld id="{C6D14FF5-F204-4143-8817-C3419B6E46E5}" type="datetimeFigureOut">
               <a:rPr lang="en-US" smtClean="0"/>
-              <a:t>7/2/2020</a:t>
+              <a:t>7/19/2020</a:t>
             </a:fld>
             <a:endParaRPr lang="en-US"/>
           </a:p>
@@ -464,7 +468,7 @@
           <a:p>
             <a:fld id="{C6D14FF5-F204-4143-8817-C3419B6E46E5}" type="datetimeFigureOut">
               <a:rPr lang="en-US" smtClean="0"/>
-              <a:t>7/2/2020</a:t>
+              <a:t>7/19/2020</a:t>
             </a:fld>
             <a:endParaRPr lang="en-US"/>
           </a:p>
@@ -672,7 +676,7 @@
           <a:p>
             <a:fld id="{C6D14FF5-F204-4143-8817-C3419B6E46E5}" type="datetimeFigureOut">
               <a:rPr lang="en-US" smtClean="0"/>
-              <a:t>7/2/2020</a:t>
+              <a:t>7/19/2020</a:t>
             </a:fld>
             <a:endParaRPr lang="en-US"/>
           </a:p>
@@ -870,7 +874,7 @@
           <a:p>
             <a:fld id="{C6D14FF5-F204-4143-8817-C3419B6E46E5}" type="datetimeFigureOut">
               <a:rPr lang="en-US" smtClean="0"/>
-              <a:t>7/2/2020</a:t>
+              <a:t>7/19/2020</a:t>
             </a:fld>
             <a:endParaRPr lang="en-US"/>
           </a:p>
@@ -1145,7 +1149,7 @@
           <a:p>
             <a:fld id="{C6D14FF5-F204-4143-8817-C3419B6E46E5}" type="datetimeFigureOut">
               <a:rPr lang="en-US" smtClean="0"/>
-              <a:t>7/2/2020</a:t>
+              <a:t>7/19/2020</a:t>
             </a:fld>
             <a:endParaRPr lang="en-US"/>
           </a:p>
@@ -1410,7 +1414,7 @@
           <a:p>
             <a:fld id="{C6D14FF5-F204-4143-8817-C3419B6E46E5}" type="datetimeFigureOut">
               <a:rPr lang="en-US" smtClean="0"/>
-              <a:t>7/2/2020</a:t>
+              <a:t>7/19/2020</a:t>
             </a:fld>
             <a:endParaRPr lang="en-US"/>
           </a:p>
@@ -1822,7 +1826,7 @@
           <a:p>
             <a:fld id="{C6D14FF5-F204-4143-8817-C3419B6E46E5}" type="datetimeFigureOut">
               <a:rPr lang="en-US" smtClean="0"/>
-              <a:t>7/2/2020</a:t>
+              <a:t>7/19/2020</a:t>
             </a:fld>
             <a:endParaRPr lang="en-US"/>
           </a:p>
@@ -1963,7 +1967,7 @@
           <a:p>
             <a:fld id="{C6D14FF5-F204-4143-8817-C3419B6E46E5}" type="datetimeFigureOut">
               <a:rPr lang="en-US" smtClean="0"/>
-              <a:t>7/2/2020</a:t>
+              <a:t>7/19/2020</a:t>
             </a:fld>
             <a:endParaRPr lang="en-US"/>
           </a:p>
@@ -2076,7 +2080,7 @@
           <a:p>
             <a:fld id="{C6D14FF5-F204-4143-8817-C3419B6E46E5}" type="datetimeFigureOut">
               <a:rPr lang="en-US" smtClean="0"/>
-              <a:t>7/2/2020</a:t>
+              <a:t>7/19/2020</a:t>
             </a:fld>
             <a:endParaRPr lang="en-US"/>
           </a:p>
@@ -2387,7 +2391,7 @@
           <a:p>
             <a:fld id="{C6D14FF5-F204-4143-8817-C3419B6E46E5}" type="datetimeFigureOut">
               <a:rPr lang="en-US" smtClean="0"/>
-              <a:t>7/2/2020</a:t>
+              <a:t>7/19/2020</a:t>
             </a:fld>
             <a:endParaRPr lang="en-US"/>
           </a:p>
@@ -2675,7 +2679,7 @@
           <a:p>
             <a:fld id="{C6D14FF5-F204-4143-8817-C3419B6E46E5}" type="datetimeFigureOut">
               <a:rPr lang="en-US" smtClean="0"/>
-              <a:t>7/2/2020</a:t>
+              <a:t>7/19/2020</a:t>
             </a:fld>
             <a:endParaRPr lang="en-US"/>
           </a:p>
@@ -2916,7 +2920,7 @@
           <a:p>
             <a:fld id="{C6D14FF5-F204-4143-8817-C3419B6E46E5}" type="datetimeFigureOut">
               <a:rPr lang="en-US" smtClean="0"/>
-              <a:t>7/2/2020</a:t>
+              <a:t>7/19/2020</a:t>
             </a:fld>
             <a:endParaRPr lang="en-US"/>
           </a:p>
@@ -3641,10 +3645,1530 @@
           </a:p>
         </p:txBody>
       </p:sp>
+      <p:cxnSp>
+        <p:nvCxnSpPr>
+          <p:cNvPr id="3" name="Straight Connector 2">
+            <a:extLst>
+              <a:ext uri="{FF2B5EF4-FFF2-40B4-BE49-F238E27FC236}">
+                <a16:creationId xmlns:a16="http://schemas.microsoft.com/office/drawing/2014/main" id="{1F468355-FFFC-408F-B94D-652E8DF9BFBE}"/>
+              </a:ext>
+            </a:extLst>
+          </p:cNvPr>
+          <p:cNvCxnSpPr>
+            <a:cxnSpLocks/>
+          </p:cNvCxnSpPr>
+          <p:nvPr/>
+        </p:nvCxnSpPr>
+        <p:spPr>
+          <a:xfrm>
+            <a:off x="6249798" y="4345497"/>
+            <a:ext cx="2306973" cy="0"/>
+          </a:xfrm>
+          <a:prstGeom prst="line">
+            <a:avLst/>
+          </a:prstGeom>
+          <a:ln w="38100" cap="flat" cmpd="sng" algn="ctr">
+            <a:solidFill>
+              <a:schemeClr val="dk1"/>
+            </a:solidFill>
+            <a:prstDash val="dash"/>
+            <a:round/>
+            <a:headEnd type="none" w="med" len="med"/>
+            <a:tailEnd type="none" w="med" len="med"/>
+          </a:ln>
+        </p:spPr>
+        <p:style>
+          <a:lnRef idx="0">
+            <a:scrgbClr r="0" g="0" b="0"/>
+          </a:lnRef>
+          <a:fillRef idx="0">
+            <a:scrgbClr r="0" g="0" b="0"/>
+          </a:fillRef>
+          <a:effectRef idx="0">
+            <a:scrgbClr r="0" g="0" b="0"/>
+          </a:effectRef>
+          <a:fontRef idx="minor">
+            <a:schemeClr val="tx1"/>
+          </a:fontRef>
+        </p:style>
+      </p:cxnSp>
     </p:spTree>
     <p:extLst>
       <p:ext uri="{BB962C8B-B14F-4D97-AF65-F5344CB8AC3E}">
         <p14:creationId xmlns:p14="http://schemas.microsoft.com/office/powerpoint/2010/main" val="373707200"/>
+      </p:ext>
+    </p:extLst>
+  </p:cSld>
+  <p:clrMapOvr>
+    <a:masterClrMapping/>
+  </p:clrMapOvr>
+</p:sld>
+</file>
+
+<file path=ppt/slides/slide10.xml><?xml version="1.0" encoding="utf-8"?>
+<p:sld xmlns:a="http://schemas.openxmlformats.org/drawingml/2006/main" xmlns:r="http://schemas.openxmlformats.org/officeDocument/2006/relationships" xmlns:p="http://schemas.openxmlformats.org/presentationml/2006/main">
+  <p:cSld>
+    <p:spTree>
+      <p:nvGrpSpPr>
+        <p:cNvPr id="1" name=""/>
+        <p:cNvGrpSpPr/>
+        <p:nvPr/>
+      </p:nvGrpSpPr>
+      <p:grpSpPr>
+        <a:xfrm>
+          <a:off x="0" y="0"/>
+          <a:ext cx="0" cy="0"/>
+          <a:chOff x="0" y="0"/>
+          <a:chExt cx="0" cy="0"/>
+        </a:xfrm>
+      </p:grpSpPr>
+      <p:sp>
+        <p:nvSpPr>
+          <p:cNvPr id="4" name="Rectangle 3">
+            <a:extLst>
+              <a:ext uri="{FF2B5EF4-FFF2-40B4-BE49-F238E27FC236}">
+                <a16:creationId xmlns:a16="http://schemas.microsoft.com/office/drawing/2014/main" id="{9C3054B4-BDFE-4B35-806C-E95E2D5DE5BE}"/>
+              </a:ext>
+            </a:extLst>
+          </p:cNvPr>
+          <p:cNvSpPr/>
+          <p:nvPr/>
+        </p:nvSpPr>
+        <p:spPr>
+          <a:xfrm>
+            <a:off x="905692" y="1759132"/>
+            <a:ext cx="2464526" cy="3814354"/>
+          </a:xfrm>
+          <a:prstGeom prst="rect">
+            <a:avLst/>
+          </a:prstGeom>
+        </p:spPr>
+        <p:style>
+          <a:lnRef idx="2">
+            <a:schemeClr val="accent1">
+              <a:shade val="50000"/>
+            </a:schemeClr>
+          </a:lnRef>
+          <a:fillRef idx="1">
+            <a:schemeClr val="accent1"/>
+          </a:fillRef>
+          <a:effectRef idx="0">
+            <a:schemeClr val="accent1"/>
+          </a:effectRef>
+          <a:fontRef idx="minor">
+            <a:schemeClr val="lt1"/>
+          </a:fontRef>
+        </p:style>
+        <p:txBody>
+          <a:bodyPr rtlCol="0" anchor="ctr"/>
+          <a:lstStyle/>
+          <a:p>
+            <a:pPr algn="ctr"/>
+            <a:endParaRPr lang="en-US"/>
+          </a:p>
+        </p:txBody>
+      </p:sp>
+      <p:sp>
+        <p:nvSpPr>
+          <p:cNvPr id="5" name="Rectangle 4">
+            <a:extLst>
+              <a:ext uri="{FF2B5EF4-FFF2-40B4-BE49-F238E27FC236}">
+                <a16:creationId xmlns:a16="http://schemas.microsoft.com/office/drawing/2014/main" id="{036DA348-1DA5-4888-B490-1790232FE335}"/>
+              </a:ext>
+            </a:extLst>
+          </p:cNvPr>
+          <p:cNvSpPr/>
+          <p:nvPr/>
+        </p:nvSpPr>
+        <p:spPr>
+          <a:xfrm>
+            <a:off x="1654627" y="2131429"/>
+            <a:ext cx="966651" cy="587827"/>
+          </a:xfrm>
+          <a:prstGeom prst="rect">
+            <a:avLst/>
+          </a:prstGeom>
+          <a:solidFill>
+            <a:srgbClr val="00B050"/>
+          </a:solidFill>
+          <a:ln>
+            <a:solidFill>
+              <a:schemeClr val="accent6"/>
+            </a:solidFill>
+          </a:ln>
+        </p:spPr>
+        <p:style>
+          <a:lnRef idx="2">
+            <a:schemeClr val="accent1">
+              <a:shade val="50000"/>
+            </a:schemeClr>
+          </a:lnRef>
+          <a:fillRef idx="1">
+            <a:schemeClr val="accent1"/>
+          </a:fillRef>
+          <a:effectRef idx="0">
+            <a:schemeClr val="accent1"/>
+          </a:effectRef>
+          <a:fontRef idx="minor">
+            <a:schemeClr val="lt1"/>
+          </a:fontRef>
+        </p:style>
+        <p:txBody>
+          <a:bodyPr rtlCol="0" anchor="ctr"/>
+          <a:lstStyle/>
+          <a:p>
+            <a:pPr algn="ctr"/>
+            <a:r>
+              <a:rPr lang="en-US" sz="1600" dirty="0"/>
+              <a:t>TextView </a:t>
+            </a:r>
+          </a:p>
+        </p:txBody>
+      </p:sp>
+      <p:sp>
+        <p:nvSpPr>
+          <p:cNvPr id="8" name="Rectangle 7">
+            <a:extLst>
+              <a:ext uri="{FF2B5EF4-FFF2-40B4-BE49-F238E27FC236}">
+                <a16:creationId xmlns:a16="http://schemas.microsoft.com/office/drawing/2014/main" id="{F633EAA7-8835-48C4-B4E8-1B3E83151D07}"/>
+              </a:ext>
+            </a:extLst>
+          </p:cNvPr>
+          <p:cNvSpPr/>
+          <p:nvPr/>
+        </p:nvSpPr>
+        <p:spPr>
+          <a:xfrm>
+            <a:off x="1589311" y="2908663"/>
+            <a:ext cx="1097281" cy="918754"/>
+          </a:xfrm>
+          <a:prstGeom prst="rect">
+            <a:avLst/>
+          </a:prstGeom>
+          <a:solidFill>
+            <a:srgbClr val="00B050"/>
+          </a:solidFill>
+          <a:ln>
+            <a:solidFill>
+              <a:schemeClr val="accent6"/>
+            </a:solidFill>
+          </a:ln>
+        </p:spPr>
+        <p:style>
+          <a:lnRef idx="2">
+            <a:schemeClr val="accent1">
+              <a:shade val="50000"/>
+            </a:schemeClr>
+          </a:lnRef>
+          <a:fillRef idx="1">
+            <a:schemeClr val="accent1"/>
+          </a:fillRef>
+          <a:effectRef idx="0">
+            <a:schemeClr val="accent1"/>
+          </a:effectRef>
+          <a:fontRef idx="minor">
+            <a:schemeClr val="lt1"/>
+          </a:fontRef>
+        </p:style>
+        <p:txBody>
+          <a:bodyPr rtlCol="0" anchor="ctr"/>
+          <a:lstStyle/>
+          <a:p>
+            <a:pPr algn="ctr"/>
+            <a:r>
+              <a:rPr lang="en-US" sz="1600" dirty="0"/>
+              <a:t>ImageView </a:t>
+            </a:r>
+          </a:p>
+        </p:txBody>
+      </p:sp>
+      <p:sp>
+        <p:nvSpPr>
+          <p:cNvPr id="9" name="Rectangle 8">
+            <a:extLst>
+              <a:ext uri="{FF2B5EF4-FFF2-40B4-BE49-F238E27FC236}">
+                <a16:creationId xmlns:a16="http://schemas.microsoft.com/office/drawing/2014/main" id="{3ADBAAAC-EC0F-4301-A34C-0B4388730C7E}"/>
+              </a:ext>
+            </a:extLst>
+          </p:cNvPr>
+          <p:cNvSpPr/>
+          <p:nvPr/>
+        </p:nvSpPr>
+        <p:spPr>
+          <a:xfrm>
+            <a:off x="1589310" y="3987429"/>
+            <a:ext cx="1097281" cy="622668"/>
+          </a:xfrm>
+          <a:prstGeom prst="rect">
+            <a:avLst/>
+          </a:prstGeom>
+          <a:solidFill>
+            <a:srgbClr val="00B050"/>
+          </a:solidFill>
+          <a:ln>
+            <a:solidFill>
+              <a:schemeClr val="accent6"/>
+            </a:solidFill>
+          </a:ln>
+        </p:spPr>
+        <p:style>
+          <a:lnRef idx="2">
+            <a:schemeClr val="accent1">
+              <a:shade val="50000"/>
+            </a:schemeClr>
+          </a:lnRef>
+          <a:fillRef idx="1">
+            <a:schemeClr val="accent1"/>
+          </a:fillRef>
+          <a:effectRef idx="0">
+            <a:schemeClr val="accent1"/>
+          </a:effectRef>
+          <a:fontRef idx="minor">
+            <a:schemeClr val="lt1"/>
+          </a:fontRef>
+        </p:style>
+        <p:txBody>
+          <a:bodyPr rtlCol="0" anchor="ctr"/>
+          <a:lstStyle/>
+          <a:p>
+            <a:pPr algn="ctr"/>
+            <a:r>
+              <a:rPr lang="en-US" sz="1600" dirty="0"/>
+              <a:t>LoginView </a:t>
+            </a:r>
+          </a:p>
+        </p:txBody>
+      </p:sp>
+      <p:sp>
+        <p:nvSpPr>
+          <p:cNvPr id="10" name="Arrow: Right 9">
+            <a:extLst>
+              <a:ext uri="{FF2B5EF4-FFF2-40B4-BE49-F238E27FC236}">
+                <a16:creationId xmlns:a16="http://schemas.microsoft.com/office/drawing/2014/main" id="{F85A28AB-CB61-45EA-9E29-7E8AD9B2A9CF}"/>
+              </a:ext>
+            </a:extLst>
+          </p:cNvPr>
+          <p:cNvSpPr/>
+          <p:nvPr/>
+        </p:nvSpPr>
+        <p:spPr>
+          <a:xfrm>
+            <a:off x="3564633" y="3342785"/>
+            <a:ext cx="978408" cy="484632"/>
+          </a:xfrm>
+          <a:prstGeom prst="rightArrow">
+            <a:avLst/>
+          </a:prstGeom>
+        </p:spPr>
+        <p:style>
+          <a:lnRef idx="2">
+            <a:schemeClr val="accent1">
+              <a:shade val="50000"/>
+            </a:schemeClr>
+          </a:lnRef>
+          <a:fillRef idx="1">
+            <a:schemeClr val="accent1"/>
+          </a:fillRef>
+          <a:effectRef idx="0">
+            <a:schemeClr val="accent1"/>
+          </a:effectRef>
+          <a:fontRef idx="minor">
+            <a:schemeClr val="lt1"/>
+          </a:fontRef>
+        </p:style>
+        <p:txBody>
+          <a:bodyPr rtlCol="0" anchor="ctr"/>
+          <a:lstStyle/>
+          <a:p>
+            <a:pPr algn="ctr"/>
+            <a:endParaRPr lang="en-US"/>
+          </a:p>
+        </p:txBody>
+      </p:sp>
+      <p:sp>
+        <p:nvSpPr>
+          <p:cNvPr id="11" name="Rectangle 10">
+            <a:extLst>
+              <a:ext uri="{FF2B5EF4-FFF2-40B4-BE49-F238E27FC236}">
+                <a16:creationId xmlns:a16="http://schemas.microsoft.com/office/drawing/2014/main" id="{EE44D4DD-CA49-4C9A-9503-D74ADDE11AC4}"/>
+              </a:ext>
+            </a:extLst>
+          </p:cNvPr>
+          <p:cNvSpPr/>
+          <p:nvPr/>
+        </p:nvSpPr>
+        <p:spPr>
+          <a:xfrm>
+            <a:off x="4754874" y="1759132"/>
+            <a:ext cx="2464526" cy="3814354"/>
+          </a:xfrm>
+          <a:prstGeom prst="rect">
+            <a:avLst/>
+          </a:prstGeom>
+        </p:spPr>
+        <p:style>
+          <a:lnRef idx="2">
+            <a:schemeClr val="accent1">
+              <a:shade val="50000"/>
+            </a:schemeClr>
+          </a:lnRef>
+          <a:fillRef idx="1">
+            <a:schemeClr val="accent1"/>
+          </a:fillRef>
+          <a:effectRef idx="0">
+            <a:schemeClr val="accent1"/>
+          </a:effectRef>
+          <a:fontRef idx="minor">
+            <a:schemeClr val="lt1"/>
+          </a:fontRef>
+        </p:style>
+        <p:txBody>
+          <a:bodyPr rtlCol="0" anchor="ctr"/>
+          <a:lstStyle/>
+          <a:p>
+            <a:pPr algn="ctr"/>
+            <a:endParaRPr lang="en-US"/>
+          </a:p>
+        </p:txBody>
+      </p:sp>
+      <p:sp>
+        <p:nvSpPr>
+          <p:cNvPr id="12" name="Rectangle 11">
+            <a:extLst>
+              <a:ext uri="{FF2B5EF4-FFF2-40B4-BE49-F238E27FC236}">
+                <a16:creationId xmlns:a16="http://schemas.microsoft.com/office/drawing/2014/main" id="{9FF5002A-AE12-41A3-A2CF-F491C350686E}"/>
+              </a:ext>
+            </a:extLst>
+          </p:cNvPr>
+          <p:cNvSpPr/>
+          <p:nvPr/>
+        </p:nvSpPr>
+        <p:spPr>
+          <a:xfrm>
+            <a:off x="5503809" y="2131429"/>
+            <a:ext cx="966651" cy="587827"/>
+          </a:xfrm>
+          <a:prstGeom prst="rect">
+            <a:avLst/>
+          </a:prstGeom>
+          <a:solidFill>
+            <a:srgbClr val="00B050"/>
+          </a:solidFill>
+          <a:ln>
+            <a:solidFill>
+              <a:schemeClr val="accent6"/>
+            </a:solidFill>
+          </a:ln>
+        </p:spPr>
+        <p:style>
+          <a:lnRef idx="2">
+            <a:schemeClr val="accent1">
+              <a:shade val="50000"/>
+            </a:schemeClr>
+          </a:lnRef>
+          <a:fillRef idx="1">
+            <a:schemeClr val="accent1"/>
+          </a:fillRef>
+          <a:effectRef idx="0">
+            <a:schemeClr val="accent1"/>
+          </a:effectRef>
+          <a:fontRef idx="minor">
+            <a:schemeClr val="lt1"/>
+          </a:fontRef>
+        </p:style>
+        <p:txBody>
+          <a:bodyPr rtlCol="0" anchor="ctr"/>
+          <a:lstStyle/>
+          <a:p>
+            <a:pPr algn="ctr"/>
+            <a:r>
+              <a:rPr lang="en-US" sz="1600" dirty="0"/>
+              <a:t>TextView </a:t>
+            </a:r>
+          </a:p>
+        </p:txBody>
+      </p:sp>
+      <p:sp>
+        <p:nvSpPr>
+          <p:cNvPr id="13" name="Rectangle 12">
+            <a:extLst>
+              <a:ext uri="{FF2B5EF4-FFF2-40B4-BE49-F238E27FC236}">
+                <a16:creationId xmlns:a16="http://schemas.microsoft.com/office/drawing/2014/main" id="{E4F764CB-B5CE-4FB6-9F20-29A5569C6D40}"/>
+              </a:ext>
+            </a:extLst>
+          </p:cNvPr>
+          <p:cNvSpPr/>
+          <p:nvPr/>
+        </p:nvSpPr>
+        <p:spPr>
+          <a:xfrm>
+            <a:off x="5438493" y="2908663"/>
+            <a:ext cx="1097281" cy="918754"/>
+          </a:xfrm>
+          <a:prstGeom prst="rect">
+            <a:avLst/>
+          </a:prstGeom>
+          <a:solidFill>
+            <a:srgbClr val="00B050"/>
+          </a:solidFill>
+          <a:ln>
+            <a:solidFill>
+              <a:schemeClr val="accent6"/>
+            </a:solidFill>
+          </a:ln>
+        </p:spPr>
+        <p:style>
+          <a:lnRef idx="2">
+            <a:schemeClr val="accent1">
+              <a:shade val="50000"/>
+            </a:schemeClr>
+          </a:lnRef>
+          <a:fillRef idx="1">
+            <a:schemeClr val="accent1"/>
+          </a:fillRef>
+          <a:effectRef idx="0">
+            <a:schemeClr val="accent1"/>
+          </a:effectRef>
+          <a:fontRef idx="minor">
+            <a:schemeClr val="lt1"/>
+          </a:fontRef>
+        </p:style>
+        <p:txBody>
+          <a:bodyPr rtlCol="0" anchor="ctr"/>
+          <a:lstStyle/>
+          <a:p>
+            <a:pPr algn="ctr"/>
+            <a:r>
+              <a:rPr lang="en-US" sz="1600" dirty="0"/>
+              <a:t>TextView</a:t>
+            </a:r>
+          </a:p>
+          <a:p>
+            <a:pPr algn="ctr"/>
+            <a:r>
+              <a:rPr lang="en-US" sz="1600" dirty="0"/>
+              <a:t>2 </a:t>
+            </a:r>
+          </a:p>
+        </p:txBody>
+      </p:sp>
+      <p:sp>
+        <p:nvSpPr>
+          <p:cNvPr id="14" name="Rectangle 13">
+            <a:extLst>
+              <a:ext uri="{FF2B5EF4-FFF2-40B4-BE49-F238E27FC236}">
+                <a16:creationId xmlns:a16="http://schemas.microsoft.com/office/drawing/2014/main" id="{5F7E93A5-4F9D-4670-91E1-CA9DC5DA0FB2}"/>
+              </a:ext>
+            </a:extLst>
+          </p:cNvPr>
+          <p:cNvSpPr/>
+          <p:nvPr/>
+        </p:nvSpPr>
+        <p:spPr>
+          <a:xfrm>
+            <a:off x="5438493" y="4088669"/>
+            <a:ext cx="1097281" cy="622668"/>
+          </a:xfrm>
+          <a:prstGeom prst="rect">
+            <a:avLst/>
+          </a:prstGeom>
+          <a:solidFill>
+            <a:srgbClr val="00B050"/>
+          </a:solidFill>
+          <a:ln>
+            <a:solidFill>
+              <a:schemeClr val="accent6"/>
+            </a:solidFill>
+          </a:ln>
+        </p:spPr>
+        <p:style>
+          <a:lnRef idx="2">
+            <a:schemeClr val="accent1">
+              <a:shade val="50000"/>
+            </a:schemeClr>
+          </a:lnRef>
+          <a:fillRef idx="1">
+            <a:schemeClr val="accent1"/>
+          </a:fillRef>
+          <a:effectRef idx="0">
+            <a:schemeClr val="accent1"/>
+          </a:effectRef>
+          <a:fontRef idx="minor">
+            <a:schemeClr val="lt1"/>
+          </a:fontRef>
+        </p:style>
+        <p:txBody>
+          <a:bodyPr rtlCol="0" anchor="ctr"/>
+          <a:lstStyle/>
+          <a:p>
+            <a:pPr algn="ctr"/>
+            <a:r>
+              <a:rPr lang="en-US" sz="1600" dirty="0"/>
+              <a:t>Button</a:t>
+            </a:r>
+          </a:p>
+        </p:txBody>
+      </p:sp>
+      <p:sp>
+        <p:nvSpPr>
+          <p:cNvPr id="15" name="Arrow: Right 14">
+            <a:extLst>
+              <a:ext uri="{FF2B5EF4-FFF2-40B4-BE49-F238E27FC236}">
+                <a16:creationId xmlns:a16="http://schemas.microsoft.com/office/drawing/2014/main" id="{8BA0BD86-9D14-4F53-98BE-C77CD29B4138}"/>
+              </a:ext>
+            </a:extLst>
+          </p:cNvPr>
+          <p:cNvSpPr/>
+          <p:nvPr/>
+        </p:nvSpPr>
+        <p:spPr>
+          <a:xfrm>
+            <a:off x="7544450" y="3368040"/>
+            <a:ext cx="978408" cy="484632"/>
+          </a:xfrm>
+          <a:prstGeom prst="rightArrow">
+            <a:avLst/>
+          </a:prstGeom>
+        </p:spPr>
+        <p:style>
+          <a:lnRef idx="2">
+            <a:schemeClr val="accent1">
+              <a:shade val="50000"/>
+            </a:schemeClr>
+          </a:lnRef>
+          <a:fillRef idx="1">
+            <a:schemeClr val="accent1"/>
+          </a:fillRef>
+          <a:effectRef idx="0">
+            <a:schemeClr val="accent1"/>
+          </a:effectRef>
+          <a:fontRef idx="minor">
+            <a:schemeClr val="lt1"/>
+          </a:fontRef>
+        </p:style>
+        <p:txBody>
+          <a:bodyPr rtlCol="0" anchor="ctr"/>
+          <a:lstStyle/>
+          <a:p>
+            <a:pPr algn="ctr"/>
+            <a:endParaRPr lang="en-US"/>
+          </a:p>
+        </p:txBody>
+      </p:sp>
+      <p:sp>
+        <p:nvSpPr>
+          <p:cNvPr id="16" name="Rectangle 15">
+            <a:extLst>
+              <a:ext uri="{FF2B5EF4-FFF2-40B4-BE49-F238E27FC236}">
+                <a16:creationId xmlns:a16="http://schemas.microsoft.com/office/drawing/2014/main" id="{6BA78DE3-CBC8-4A40-92CA-6A971C09D836}"/>
+              </a:ext>
+            </a:extLst>
+          </p:cNvPr>
+          <p:cNvSpPr/>
+          <p:nvPr/>
+        </p:nvSpPr>
+        <p:spPr>
+          <a:xfrm>
+            <a:off x="8786942" y="1759132"/>
+            <a:ext cx="2464526" cy="3814354"/>
+          </a:xfrm>
+          <a:prstGeom prst="rect">
+            <a:avLst/>
+          </a:prstGeom>
+        </p:spPr>
+        <p:style>
+          <a:lnRef idx="2">
+            <a:schemeClr val="accent1">
+              <a:shade val="50000"/>
+            </a:schemeClr>
+          </a:lnRef>
+          <a:fillRef idx="1">
+            <a:schemeClr val="accent1"/>
+          </a:fillRef>
+          <a:effectRef idx="0">
+            <a:schemeClr val="accent1"/>
+          </a:effectRef>
+          <a:fontRef idx="minor">
+            <a:schemeClr val="lt1"/>
+          </a:fontRef>
+        </p:style>
+        <p:txBody>
+          <a:bodyPr rtlCol="0" anchor="ctr"/>
+          <a:lstStyle/>
+          <a:p>
+            <a:pPr algn="ctr"/>
+            <a:endParaRPr lang="en-US"/>
+          </a:p>
+        </p:txBody>
+      </p:sp>
+      <p:sp>
+        <p:nvSpPr>
+          <p:cNvPr id="17" name="Rectangle 16">
+            <a:extLst>
+              <a:ext uri="{FF2B5EF4-FFF2-40B4-BE49-F238E27FC236}">
+                <a16:creationId xmlns:a16="http://schemas.microsoft.com/office/drawing/2014/main" id="{F38BF4A7-E95C-462B-B93A-DAA8D5084050}"/>
+              </a:ext>
+            </a:extLst>
+          </p:cNvPr>
+          <p:cNvSpPr/>
+          <p:nvPr/>
+        </p:nvSpPr>
+        <p:spPr>
+          <a:xfrm>
+            <a:off x="9535877" y="2131429"/>
+            <a:ext cx="966651" cy="587827"/>
+          </a:xfrm>
+          <a:prstGeom prst="rect">
+            <a:avLst/>
+          </a:prstGeom>
+          <a:solidFill>
+            <a:srgbClr val="00B050"/>
+          </a:solidFill>
+          <a:ln>
+            <a:solidFill>
+              <a:schemeClr val="accent6"/>
+            </a:solidFill>
+          </a:ln>
+        </p:spPr>
+        <p:style>
+          <a:lnRef idx="2">
+            <a:schemeClr val="accent1">
+              <a:shade val="50000"/>
+            </a:schemeClr>
+          </a:lnRef>
+          <a:fillRef idx="1">
+            <a:schemeClr val="accent1"/>
+          </a:fillRef>
+          <a:effectRef idx="0">
+            <a:schemeClr val="accent1"/>
+          </a:effectRef>
+          <a:fontRef idx="minor">
+            <a:schemeClr val="lt1"/>
+          </a:fontRef>
+        </p:style>
+        <p:txBody>
+          <a:bodyPr rtlCol="0" anchor="ctr"/>
+          <a:lstStyle/>
+          <a:p>
+            <a:pPr algn="ctr"/>
+            <a:r>
+              <a:rPr lang="en-US" sz="1600" dirty="0"/>
+              <a:t>TextView </a:t>
+            </a:r>
+          </a:p>
+        </p:txBody>
+      </p:sp>
+      <p:sp>
+        <p:nvSpPr>
+          <p:cNvPr id="18" name="Rectangle 17">
+            <a:extLst>
+              <a:ext uri="{FF2B5EF4-FFF2-40B4-BE49-F238E27FC236}">
+                <a16:creationId xmlns:a16="http://schemas.microsoft.com/office/drawing/2014/main" id="{4AA146BA-5B0C-49DD-9D77-C2302277F5C3}"/>
+              </a:ext>
+            </a:extLst>
+          </p:cNvPr>
+          <p:cNvSpPr/>
+          <p:nvPr/>
+        </p:nvSpPr>
+        <p:spPr>
+          <a:xfrm>
+            <a:off x="9470561" y="2908663"/>
+            <a:ext cx="1097281" cy="918754"/>
+          </a:xfrm>
+          <a:prstGeom prst="rect">
+            <a:avLst/>
+          </a:prstGeom>
+          <a:solidFill>
+            <a:srgbClr val="00B050"/>
+          </a:solidFill>
+          <a:ln>
+            <a:solidFill>
+              <a:schemeClr val="accent6"/>
+            </a:solidFill>
+          </a:ln>
+        </p:spPr>
+        <p:style>
+          <a:lnRef idx="2">
+            <a:schemeClr val="accent1">
+              <a:shade val="50000"/>
+            </a:schemeClr>
+          </a:lnRef>
+          <a:fillRef idx="1">
+            <a:schemeClr val="accent1"/>
+          </a:fillRef>
+          <a:effectRef idx="0">
+            <a:schemeClr val="accent1"/>
+          </a:effectRef>
+          <a:fontRef idx="minor">
+            <a:schemeClr val="lt1"/>
+          </a:fontRef>
+        </p:style>
+        <p:txBody>
+          <a:bodyPr rtlCol="0" anchor="ctr"/>
+          <a:lstStyle/>
+          <a:p>
+            <a:pPr algn="ctr"/>
+            <a:r>
+              <a:rPr lang="en-US" sz="1600" dirty="0"/>
+              <a:t>TextView </a:t>
+            </a:r>
+          </a:p>
+          <a:p>
+            <a:pPr algn="ctr"/>
+            <a:r>
+              <a:rPr lang="en-US" sz="1600" dirty="0"/>
+              <a:t>3 </a:t>
+            </a:r>
+          </a:p>
+        </p:txBody>
+      </p:sp>
+      <p:sp>
+        <p:nvSpPr>
+          <p:cNvPr id="19" name="Rectangle 18">
+            <a:extLst>
+              <a:ext uri="{FF2B5EF4-FFF2-40B4-BE49-F238E27FC236}">
+                <a16:creationId xmlns:a16="http://schemas.microsoft.com/office/drawing/2014/main" id="{88CF03C6-AD3E-4D8D-9D25-2F9AAA82DFA8}"/>
+              </a:ext>
+            </a:extLst>
+          </p:cNvPr>
+          <p:cNvSpPr/>
+          <p:nvPr/>
+        </p:nvSpPr>
+        <p:spPr>
+          <a:xfrm>
+            <a:off x="9470561" y="4088669"/>
+            <a:ext cx="1097281" cy="622668"/>
+          </a:xfrm>
+          <a:prstGeom prst="rect">
+            <a:avLst/>
+          </a:prstGeom>
+          <a:solidFill>
+            <a:srgbClr val="00B050"/>
+          </a:solidFill>
+          <a:ln>
+            <a:solidFill>
+              <a:schemeClr val="accent6"/>
+            </a:solidFill>
+          </a:ln>
+        </p:spPr>
+        <p:style>
+          <a:lnRef idx="2">
+            <a:schemeClr val="accent1">
+              <a:shade val="50000"/>
+            </a:schemeClr>
+          </a:lnRef>
+          <a:fillRef idx="1">
+            <a:schemeClr val="accent1"/>
+          </a:fillRef>
+          <a:effectRef idx="0">
+            <a:schemeClr val="accent1"/>
+          </a:effectRef>
+          <a:fontRef idx="minor">
+            <a:schemeClr val="lt1"/>
+          </a:fontRef>
+        </p:style>
+        <p:txBody>
+          <a:bodyPr rtlCol="0" anchor="ctr"/>
+          <a:lstStyle/>
+          <a:p>
+            <a:pPr algn="ctr"/>
+            <a:r>
+              <a:rPr lang="en-US" sz="1600" dirty="0"/>
+              <a:t>ImageView</a:t>
+            </a:r>
+          </a:p>
+        </p:txBody>
+      </p:sp>
+      <p:sp>
+        <p:nvSpPr>
+          <p:cNvPr id="20" name="Rectangle 19">
+            <a:extLst>
+              <a:ext uri="{FF2B5EF4-FFF2-40B4-BE49-F238E27FC236}">
+                <a16:creationId xmlns:a16="http://schemas.microsoft.com/office/drawing/2014/main" id="{6D63E631-AAB0-4DD6-945E-8A2F14FA9BC4}"/>
+              </a:ext>
+            </a:extLst>
+          </p:cNvPr>
+          <p:cNvSpPr/>
+          <p:nvPr/>
+        </p:nvSpPr>
+        <p:spPr>
+          <a:xfrm>
+            <a:off x="1589311" y="4770110"/>
+            <a:ext cx="1097281" cy="622668"/>
+          </a:xfrm>
+          <a:prstGeom prst="rect">
+            <a:avLst/>
+          </a:prstGeom>
+          <a:solidFill>
+            <a:srgbClr val="00B050"/>
+          </a:solidFill>
+          <a:ln>
+            <a:solidFill>
+              <a:schemeClr val="accent6"/>
+            </a:solidFill>
+          </a:ln>
+        </p:spPr>
+        <p:style>
+          <a:lnRef idx="2">
+            <a:schemeClr val="accent1">
+              <a:shade val="50000"/>
+            </a:schemeClr>
+          </a:lnRef>
+          <a:fillRef idx="1">
+            <a:schemeClr val="accent1"/>
+          </a:fillRef>
+          <a:effectRef idx="0">
+            <a:schemeClr val="accent1"/>
+          </a:effectRef>
+          <a:fontRef idx="minor">
+            <a:schemeClr val="lt1"/>
+          </a:fontRef>
+        </p:style>
+        <p:txBody>
+          <a:bodyPr rtlCol="0" anchor="ctr"/>
+          <a:lstStyle/>
+          <a:p>
+            <a:pPr algn="ctr"/>
+            <a:r>
+              <a:rPr lang="en-US" sz="1600" dirty="0"/>
+              <a:t>Button</a:t>
+            </a:r>
+          </a:p>
+        </p:txBody>
+      </p:sp>
+      <p:sp>
+        <p:nvSpPr>
+          <p:cNvPr id="21" name="TextBox 20">
+            <a:extLst>
+              <a:ext uri="{FF2B5EF4-FFF2-40B4-BE49-F238E27FC236}">
+                <a16:creationId xmlns:a16="http://schemas.microsoft.com/office/drawing/2014/main" id="{3191C058-EA50-404C-9583-338B74EEBADA}"/>
+              </a:ext>
+            </a:extLst>
+          </p:cNvPr>
+          <p:cNvSpPr txBox="1"/>
+          <p:nvPr/>
+        </p:nvSpPr>
+        <p:spPr>
+          <a:xfrm>
+            <a:off x="1567784" y="1309794"/>
+            <a:ext cx="1053494" cy="369332"/>
+          </a:xfrm>
+          <a:prstGeom prst="rect">
+            <a:avLst/>
+          </a:prstGeom>
+          <a:noFill/>
+        </p:spPr>
+        <p:txBody>
+          <a:bodyPr wrap="none" rtlCol="0">
+            <a:spAutoFit/>
+          </a:bodyPr>
+          <a:lstStyle/>
+          <a:p>
+            <a:r>
+              <a:rPr lang="en-US" dirty="0"/>
+              <a:t>Activity 1</a:t>
+            </a:r>
+          </a:p>
+        </p:txBody>
+      </p:sp>
+      <p:sp>
+        <p:nvSpPr>
+          <p:cNvPr id="22" name="TextBox 21">
+            <a:extLst>
+              <a:ext uri="{FF2B5EF4-FFF2-40B4-BE49-F238E27FC236}">
+                <a16:creationId xmlns:a16="http://schemas.microsoft.com/office/drawing/2014/main" id="{C065A83E-98A9-45FA-9437-2D2CB04A6656}"/>
+              </a:ext>
+            </a:extLst>
+          </p:cNvPr>
+          <p:cNvSpPr txBox="1"/>
+          <p:nvPr/>
+        </p:nvSpPr>
+        <p:spPr>
+          <a:xfrm>
+            <a:off x="5416966" y="1309794"/>
+            <a:ext cx="1053494" cy="369332"/>
+          </a:xfrm>
+          <a:prstGeom prst="rect">
+            <a:avLst/>
+          </a:prstGeom>
+          <a:noFill/>
+        </p:spPr>
+        <p:txBody>
+          <a:bodyPr wrap="none" rtlCol="0">
+            <a:spAutoFit/>
+          </a:bodyPr>
+          <a:lstStyle/>
+          <a:p>
+            <a:r>
+              <a:rPr lang="en-US" dirty="0"/>
+              <a:t>Activity 2</a:t>
+            </a:r>
+          </a:p>
+        </p:txBody>
+      </p:sp>
+      <p:sp>
+        <p:nvSpPr>
+          <p:cNvPr id="23" name="TextBox 22">
+            <a:extLst>
+              <a:ext uri="{FF2B5EF4-FFF2-40B4-BE49-F238E27FC236}">
+                <a16:creationId xmlns:a16="http://schemas.microsoft.com/office/drawing/2014/main" id="{2A4B5188-4D89-420E-BA29-5B9A8EA86FD2}"/>
+              </a:ext>
+            </a:extLst>
+          </p:cNvPr>
+          <p:cNvSpPr txBox="1"/>
+          <p:nvPr/>
+        </p:nvSpPr>
+        <p:spPr>
+          <a:xfrm>
+            <a:off x="9449034" y="1309794"/>
+            <a:ext cx="1053494" cy="369332"/>
+          </a:xfrm>
+          <a:prstGeom prst="rect">
+            <a:avLst/>
+          </a:prstGeom>
+          <a:noFill/>
+        </p:spPr>
+        <p:txBody>
+          <a:bodyPr wrap="none" rtlCol="0">
+            <a:spAutoFit/>
+          </a:bodyPr>
+          <a:lstStyle/>
+          <a:p>
+            <a:r>
+              <a:rPr lang="en-US" dirty="0"/>
+              <a:t>Activity 3</a:t>
+            </a:r>
+          </a:p>
+        </p:txBody>
+      </p:sp>
+      <p:sp>
+        <p:nvSpPr>
+          <p:cNvPr id="24" name="TextBox 23">
+            <a:extLst>
+              <a:ext uri="{FF2B5EF4-FFF2-40B4-BE49-F238E27FC236}">
+                <a16:creationId xmlns:a16="http://schemas.microsoft.com/office/drawing/2014/main" id="{A3F2EBEC-8EFD-41F5-83BD-EFD8B17025F7}"/>
+              </a:ext>
+            </a:extLst>
+          </p:cNvPr>
+          <p:cNvSpPr txBox="1"/>
+          <p:nvPr/>
+        </p:nvSpPr>
+        <p:spPr>
+          <a:xfrm>
+            <a:off x="3634302" y="2929910"/>
+            <a:ext cx="748603" cy="369332"/>
+          </a:xfrm>
+          <a:prstGeom prst="rect">
+            <a:avLst/>
+          </a:prstGeom>
+          <a:noFill/>
+        </p:spPr>
+        <p:txBody>
+          <a:bodyPr wrap="none" rtlCol="0">
+            <a:spAutoFit/>
+          </a:bodyPr>
+          <a:lstStyle/>
+          <a:p>
+            <a:r>
+              <a:rPr lang="en-US" dirty="0"/>
+              <a:t>Intent</a:t>
+            </a:r>
+          </a:p>
+        </p:txBody>
+      </p:sp>
+      <p:sp>
+        <p:nvSpPr>
+          <p:cNvPr id="25" name="TextBox 24">
+            <a:extLst>
+              <a:ext uri="{FF2B5EF4-FFF2-40B4-BE49-F238E27FC236}">
+                <a16:creationId xmlns:a16="http://schemas.microsoft.com/office/drawing/2014/main" id="{234200F6-6326-4E61-B3DA-6150AAA4472F}"/>
+              </a:ext>
+            </a:extLst>
+          </p:cNvPr>
+          <p:cNvSpPr txBox="1"/>
+          <p:nvPr/>
+        </p:nvSpPr>
+        <p:spPr>
+          <a:xfrm>
+            <a:off x="7628869" y="2929910"/>
+            <a:ext cx="748603" cy="369332"/>
+          </a:xfrm>
+          <a:prstGeom prst="rect">
+            <a:avLst/>
+          </a:prstGeom>
+          <a:noFill/>
+        </p:spPr>
+        <p:txBody>
+          <a:bodyPr wrap="none" rtlCol="0">
+            <a:spAutoFit/>
+          </a:bodyPr>
+          <a:lstStyle/>
+          <a:p>
+            <a:r>
+              <a:rPr lang="en-US" dirty="0"/>
+              <a:t>Intent</a:t>
+            </a:r>
+          </a:p>
+        </p:txBody>
+      </p:sp>
+    </p:spTree>
+    <p:extLst>
+      <p:ext uri="{BB962C8B-B14F-4D97-AF65-F5344CB8AC3E}">
+        <p14:creationId xmlns:p14="http://schemas.microsoft.com/office/powerpoint/2010/main" val="2877618734"/>
+      </p:ext>
+    </p:extLst>
+  </p:cSld>
+  <p:clrMapOvr>
+    <a:masterClrMapping/>
+  </p:clrMapOvr>
+</p:sld>
+</file>
+
+<file path=ppt/slides/slide11.xml><?xml version="1.0" encoding="utf-8"?>
+<p:sld xmlns:a="http://schemas.openxmlformats.org/drawingml/2006/main" xmlns:r="http://schemas.openxmlformats.org/officeDocument/2006/relationships" xmlns:p="http://schemas.openxmlformats.org/presentationml/2006/main">
+  <p:cSld>
+    <p:spTree>
+      <p:nvGrpSpPr>
+        <p:cNvPr id="1" name=""/>
+        <p:cNvGrpSpPr/>
+        <p:nvPr/>
+      </p:nvGrpSpPr>
+      <p:grpSpPr>
+        <a:xfrm>
+          <a:off x="0" y="0"/>
+          <a:ext cx="0" cy="0"/>
+          <a:chOff x="0" y="0"/>
+          <a:chExt cx="0" cy="0"/>
+        </a:xfrm>
+      </p:grpSpPr>
+      <p:sp>
+        <p:nvSpPr>
+          <p:cNvPr id="4" name="Rectangle 3">
+            <a:extLst>
+              <a:ext uri="{FF2B5EF4-FFF2-40B4-BE49-F238E27FC236}">
+                <a16:creationId xmlns:a16="http://schemas.microsoft.com/office/drawing/2014/main" id="{9C3054B4-BDFE-4B35-806C-E95E2D5DE5BE}"/>
+              </a:ext>
+            </a:extLst>
+          </p:cNvPr>
+          <p:cNvSpPr/>
+          <p:nvPr/>
+        </p:nvSpPr>
+        <p:spPr>
+          <a:xfrm>
+            <a:off x="905692" y="1759132"/>
+            <a:ext cx="2464526" cy="3814354"/>
+          </a:xfrm>
+          <a:prstGeom prst="rect">
+            <a:avLst/>
+          </a:prstGeom>
+        </p:spPr>
+        <p:style>
+          <a:lnRef idx="2">
+            <a:schemeClr val="accent1">
+              <a:shade val="50000"/>
+            </a:schemeClr>
+          </a:lnRef>
+          <a:fillRef idx="1">
+            <a:schemeClr val="accent1"/>
+          </a:fillRef>
+          <a:effectRef idx="0">
+            <a:schemeClr val="accent1"/>
+          </a:effectRef>
+          <a:fontRef idx="minor">
+            <a:schemeClr val="lt1"/>
+          </a:fontRef>
+        </p:style>
+        <p:txBody>
+          <a:bodyPr rtlCol="0" anchor="ctr"/>
+          <a:lstStyle/>
+          <a:p>
+            <a:pPr algn="ctr"/>
+            <a:endParaRPr lang="en-US"/>
+          </a:p>
+        </p:txBody>
+      </p:sp>
+      <p:sp>
+        <p:nvSpPr>
+          <p:cNvPr id="8" name="Rectangle 7">
+            <a:extLst>
+              <a:ext uri="{FF2B5EF4-FFF2-40B4-BE49-F238E27FC236}">
+                <a16:creationId xmlns:a16="http://schemas.microsoft.com/office/drawing/2014/main" id="{F633EAA7-8835-48C4-B4E8-1B3E83151D07}"/>
+              </a:ext>
+            </a:extLst>
+          </p:cNvPr>
+          <p:cNvSpPr/>
+          <p:nvPr/>
+        </p:nvSpPr>
+        <p:spPr>
+          <a:xfrm>
+            <a:off x="1589311" y="2908663"/>
+            <a:ext cx="1097281" cy="918754"/>
+          </a:xfrm>
+          <a:prstGeom prst="rect">
+            <a:avLst/>
+          </a:prstGeom>
+          <a:solidFill>
+            <a:srgbClr val="00B050"/>
+          </a:solidFill>
+          <a:ln>
+            <a:solidFill>
+              <a:schemeClr val="accent6"/>
+            </a:solidFill>
+          </a:ln>
+        </p:spPr>
+        <p:style>
+          <a:lnRef idx="2">
+            <a:schemeClr val="accent1">
+              <a:shade val="50000"/>
+            </a:schemeClr>
+          </a:lnRef>
+          <a:fillRef idx="1">
+            <a:schemeClr val="accent1"/>
+          </a:fillRef>
+          <a:effectRef idx="0">
+            <a:schemeClr val="accent1"/>
+          </a:effectRef>
+          <a:fontRef idx="minor">
+            <a:schemeClr val="lt1"/>
+          </a:fontRef>
+        </p:style>
+        <p:txBody>
+          <a:bodyPr rtlCol="0" anchor="ctr"/>
+          <a:lstStyle/>
+          <a:p>
+            <a:pPr algn="ctr"/>
+            <a:r>
+              <a:rPr lang="en-US" sz="1600" dirty="0"/>
+              <a:t>Login Activity</a:t>
+            </a:r>
+          </a:p>
+        </p:txBody>
+      </p:sp>
+      <p:sp>
+        <p:nvSpPr>
+          <p:cNvPr id="10" name="Arrow: Right 9">
+            <a:extLst>
+              <a:ext uri="{FF2B5EF4-FFF2-40B4-BE49-F238E27FC236}">
+                <a16:creationId xmlns:a16="http://schemas.microsoft.com/office/drawing/2014/main" id="{F85A28AB-CB61-45EA-9E29-7E8AD9B2A9CF}"/>
+              </a:ext>
+            </a:extLst>
+          </p:cNvPr>
+          <p:cNvSpPr/>
+          <p:nvPr/>
+        </p:nvSpPr>
+        <p:spPr>
+          <a:xfrm>
+            <a:off x="3564633" y="3342785"/>
+            <a:ext cx="978408" cy="484632"/>
+          </a:xfrm>
+          <a:prstGeom prst="rightArrow">
+            <a:avLst/>
+          </a:prstGeom>
+        </p:spPr>
+        <p:style>
+          <a:lnRef idx="2">
+            <a:schemeClr val="accent1">
+              <a:shade val="50000"/>
+            </a:schemeClr>
+          </a:lnRef>
+          <a:fillRef idx="1">
+            <a:schemeClr val="accent1"/>
+          </a:fillRef>
+          <a:effectRef idx="0">
+            <a:schemeClr val="accent1"/>
+          </a:effectRef>
+          <a:fontRef idx="minor">
+            <a:schemeClr val="lt1"/>
+          </a:fontRef>
+        </p:style>
+        <p:txBody>
+          <a:bodyPr rtlCol="0" anchor="ctr"/>
+          <a:lstStyle/>
+          <a:p>
+            <a:pPr algn="ctr"/>
+            <a:endParaRPr lang="en-US"/>
+          </a:p>
+        </p:txBody>
+      </p:sp>
+      <p:sp>
+        <p:nvSpPr>
+          <p:cNvPr id="11" name="Rectangle 10">
+            <a:extLst>
+              <a:ext uri="{FF2B5EF4-FFF2-40B4-BE49-F238E27FC236}">
+                <a16:creationId xmlns:a16="http://schemas.microsoft.com/office/drawing/2014/main" id="{EE44D4DD-CA49-4C9A-9503-D74ADDE11AC4}"/>
+              </a:ext>
+            </a:extLst>
+          </p:cNvPr>
+          <p:cNvSpPr/>
+          <p:nvPr/>
+        </p:nvSpPr>
+        <p:spPr>
+          <a:xfrm>
+            <a:off x="4754874" y="1759132"/>
+            <a:ext cx="2464526" cy="3814354"/>
+          </a:xfrm>
+          <a:prstGeom prst="rect">
+            <a:avLst/>
+          </a:prstGeom>
+        </p:spPr>
+        <p:style>
+          <a:lnRef idx="2">
+            <a:schemeClr val="accent1">
+              <a:shade val="50000"/>
+            </a:schemeClr>
+          </a:lnRef>
+          <a:fillRef idx="1">
+            <a:schemeClr val="accent1"/>
+          </a:fillRef>
+          <a:effectRef idx="0">
+            <a:schemeClr val="accent1"/>
+          </a:effectRef>
+          <a:fontRef idx="minor">
+            <a:schemeClr val="lt1"/>
+          </a:fontRef>
+        </p:style>
+        <p:txBody>
+          <a:bodyPr rtlCol="0" anchor="ctr"/>
+          <a:lstStyle/>
+          <a:p>
+            <a:pPr algn="ctr"/>
+            <a:endParaRPr lang="en-US"/>
+          </a:p>
+        </p:txBody>
+      </p:sp>
+      <p:sp>
+        <p:nvSpPr>
+          <p:cNvPr id="13" name="Rectangle 12">
+            <a:extLst>
+              <a:ext uri="{FF2B5EF4-FFF2-40B4-BE49-F238E27FC236}">
+                <a16:creationId xmlns:a16="http://schemas.microsoft.com/office/drawing/2014/main" id="{E4F764CB-B5CE-4FB6-9F20-29A5569C6D40}"/>
+              </a:ext>
+            </a:extLst>
+          </p:cNvPr>
+          <p:cNvSpPr/>
+          <p:nvPr/>
+        </p:nvSpPr>
+        <p:spPr>
+          <a:xfrm>
+            <a:off x="5438493" y="2908663"/>
+            <a:ext cx="1097281" cy="918754"/>
+          </a:xfrm>
+          <a:prstGeom prst="rect">
+            <a:avLst/>
+          </a:prstGeom>
+          <a:solidFill>
+            <a:srgbClr val="00B050"/>
+          </a:solidFill>
+          <a:ln>
+            <a:solidFill>
+              <a:schemeClr val="accent6"/>
+            </a:solidFill>
+          </a:ln>
+        </p:spPr>
+        <p:style>
+          <a:lnRef idx="2">
+            <a:schemeClr val="accent1">
+              <a:shade val="50000"/>
+            </a:schemeClr>
+          </a:lnRef>
+          <a:fillRef idx="1">
+            <a:schemeClr val="accent1"/>
+          </a:fillRef>
+          <a:effectRef idx="0">
+            <a:schemeClr val="accent1"/>
+          </a:effectRef>
+          <a:fontRef idx="minor">
+            <a:schemeClr val="lt1"/>
+          </a:fontRef>
+        </p:style>
+        <p:txBody>
+          <a:bodyPr rtlCol="0" anchor="ctr"/>
+          <a:lstStyle/>
+          <a:p>
+            <a:pPr algn="ctr"/>
+            <a:r>
+              <a:rPr lang="en-US" sz="1600" dirty="0"/>
+              <a:t>Home Page Activity </a:t>
+            </a:r>
+          </a:p>
+        </p:txBody>
+      </p:sp>
+      <p:sp>
+        <p:nvSpPr>
+          <p:cNvPr id="24" name="TextBox 23">
+            <a:extLst>
+              <a:ext uri="{FF2B5EF4-FFF2-40B4-BE49-F238E27FC236}">
+                <a16:creationId xmlns:a16="http://schemas.microsoft.com/office/drawing/2014/main" id="{A3F2EBEC-8EFD-41F5-83BD-EFD8B17025F7}"/>
+              </a:ext>
+            </a:extLst>
+          </p:cNvPr>
+          <p:cNvSpPr txBox="1"/>
+          <p:nvPr/>
+        </p:nvSpPr>
+        <p:spPr>
+          <a:xfrm>
+            <a:off x="3634302" y="2929910"/>
+            <a:ext cx="748603" cy="369332"/>
+          </a:xfrm>
+          <a:prstGeom prst="rect">
+            <a:avLst/>
+          </a:prstGeom>
+          <a:noFill/>
+        </p:spPr>
+        <p:txBody>
+          <a:bodyPr wrap="none" rtlCol="0">
+            <a:spAutoFit/>
+          </a:bodyPr>
+          <a:lstStyle/>
+          <a:p>
+            <a:r>
+              <a:rPr lang="en-US" dirty="0"/>
+              <a:t>Intent</a:t>
+            </a:r>
+          </a:p>
+        </p:txBody>
+      </p:sp>
+      <p:sp>
+        <p:nvSpPr>
+          <p:cNvPr id="26" name="Rectangle 25">
+            <a:extLst>
+              <a:ext uri="{FF2B5EF4-FFF2-40B4-BE49-F238E27FC236}">
+                <a16:creationId xmlns:a16="http://schemas.microsoft.com/office/drawing/2014/main" id="{03CEC1F2-00BE-4AAC-AED7-E1D3E01E9B40}"/>
+              </a:ext>
+            </a:extLst>
+          </p:cNvPr>
+          <p:cNvSpPr/>
+          <p:nvPr/>
+        </p:nvSpPr>
+        <p:spPr>
+          <a:xfrm>
+            <a:off x="1589311" y="4289013"/>
+            <a:ext cx="1097281" cy="531561"/>
+          </a:xfrm>
+          <a:prstGeom prst="rect">
+            <a:avLst/>
+          </a:prstGeom>
+          <a:solidFill>
+            <a:srgbClr val="00B050"/>
+          </a:solidFill>
+          <a:ln>
+            <a:solidFill>
+              <a:schemeClr val="accent6"/>
+            </a:solidFill>
+          </a:ln>
+        </p:spPr>
+        <p:style>
+          <a:lnRef idx="2">
+            <a:schemeClr val="accent1">
+              <a:shade val="50000"/>
+            </a:schemeClr>
+          </a:lnRef>
+          <a:fillRef idx="1">
+            <a:schemeClr val="accent1"/>
+          </a:fillRef>
+          <a:effectRef idx="0">
+            <a:schemeClr val="accent1"/>
+          </a:effectRef>
+          <a:fontRef idx="minor">
+            <a:schemeClr val="lt1"/>
+          </a:fontRef>
+        </p:style>
+        <p:txBody>
+          <a:bodyPr rtlCol="0" anchor="ctr"/>
+          <a:lstStyle/>
+          <a:p>
+            <a:pPr algn="ctr"/>
+            <a:r>
+              <a:rPr lang="en-US" sz="1600" dirty="0"/>
+              <a:t>Login Button</a:t>
+            </a:r>
+          </a:p>
+        </p:txBody>
+      </p:sp>
+    </p:spTree>
+    <p:extLst>
+      <p:ext uri="{BB962C8B-B14F-4D97-AF65-F5344CB8AC3E}">
+        <p14:creationId xmlns:p14="http://schemas.microsoft.com/office/powerpoint/2010/main" val="1963087710"/>
+      </p:ext>
+    </p:extLst>
+  </p:cSld>
+  <p:clrMapOvr>
+    <a:masterClrMapping/>
+  </p:clrMapOvr>
+</p:sld>
+</file>
+
+<file path=ppt/slides/slide12.xml><?xml version="1.0" encoding="utf-8"?>
+<p:sld xmlns:a="http://schemas.openxmlformats.org/drawingml/2006/main" xmlns:r="http://schemas.openxmlformats.org/officeDocument/2006/relationships" xmlns:p="http://schemas.openxmlformats.org/presentationml/2006/main">
+  <p:cSld>
+    <p:spTree>
+      <p:nvGrpSpPr>
+        <p:cNvPr id="1" name=""/>
+        <p:cNvGrpSpPr/>
+        <p:nvPr/>
+      </p:nvGrpSpPr>
+      <p:grpSpPr>
+        <a:xfrm>
+          <a:off x="0" y="0"/>
+          <a:ext cx="0" cy="0"/>
+          <a:chOff x="0" y="0"/>
+          <a:chExt cx="0" cy="0"/>
+        </a:xfrm>
+      </p:grpSpPr>
+      <p:sp>
+        <p:nvSpPr>
+          <p:cNvPr id="2" name="Title 1">
+            <a:extLst>
+              <a:ext uri="{FF2B5EF4-FFF2-40B4-BE49-F238E27FC236}">
+                <a16:creationId xmlns:a16="http://schemas.microsoft.com/office/drawing/2014/main" id="{9747B4A0-3316-4B67-8B10-FDBCE8140C80}"/>
+              </a:ext>
+            </a:extLst>
+          </p:cNvPr>
+          <p:cNvSpPr>
+            <a:spLocks noGrp="1"/>
+          </p:cNvSpPr>
+          <p:nvPr>
+            <p:ph type="title"/>
+          </p:nvPr>
+        </p:nvSpPr>
+        <p:spPr/>
+        <p:txBody>
+          <a:bodyPr/>
+          <a:lstStyle/>
+          <a:p>
+            <a:endParaRPr lang="en-US"/>
+          </a:p>
+        </p:txBody>
+      </p:sp>
+      <p:sp>
+        <p:nvSpPr>
+          <p:cNvPr id="3" name="Content Placeholder 2">
+            <a:extLst>
+              <a:ext uri="{FF2B5EF4-FFF2-40B4-BE49-F238E27FC236}">
+                <a16:creationId xmlns:a16="http://schemas.microsoft.com/office/drawing/2014/main" id="{407FC690-692D-4D69-910A-91524847F819}"/>
+              </a:ext>
+            </a:extLst>
+          </p:cNvPr>
+          <p:cNvSpPr>
+            <a:spLocks noGrp="1"/>
+          </p:cNvSpPr>
+          <p:nvPr>
+            <p:ph idx="1"/>
+          </p:nvPr>
+        </p:nvSpPr>
+        <p:spPr/>
+        <p:txBody>
+          <a:bodyPr/>
+          <a:lstStyle/>
+          <a:p>
+            <a:endParaRPr lang="en-US"/>
+          </a:p>
+        </p:txBody>
+      </p:sp>
+    </p:spTree>
+    <p:extLst>
+      <p:ext uri="{BB962C8B-B14F-4D97-AF65-F5344CB8AC3E}">
+        <p14:creationId xmlns:p14="http://schemas.microsoft.com/office/powerpoint/2010/main" val="3134449007"/>
       </p:ext>
     </p:extLst>
   </p:cSld>
@@ -4006,6 +5530,477 @@
 </file>
 
 <file path=ppt/slides/slide5.xml><?xml version="1.0" encoding="utf-8"?>
+<p:sld xmlns:a="http://schemas.openxmlformats.org/drawingml/2006/main" xmlns:r="http://schemas.openxmlformats.org/officeDocument/2006/relationships" xmlns:p="http://schemas.openxmlformats.org/presentationml/2006/main">
+  <p:cSld>
+    <p:spTree>
+      <p:nvGrpSpPr>
+        <p:cNvPr id="1" name=""/>
+        <p:cNvGrpSpPr/>
+        <p:nvPr/>
+      </p:nvGrpSpPr>
+      <p:grpSpPr>
+        <a:xfrm>
+          <a:off x="0" y="0"/>
+          <a:ext cx="0" cy="0"/>
+          <a:chOff x="0" y="0"/>
+          <a:chExt cx="0" cy="0"/>
+        </a:xfrm>
+      </p:grpSpPr>
+      <p:grpSp>
+        <p:nvGrpSpPr>
+          <p:cNvPr id="7" name="Group 6">
+            <a:extLst>
+              <a:ext uri="{FF2B5EF4-FFF2-40B4-BE49-F238E27FC236}">
+                <a16:creationId xmlns:a16="http://schemas.microsoft.com/office/drawing/2014/main" id="{5AB4CEDB-7211-4E36-9F77-512FE4B6D231}"/>
+              </a:ext>
+            </a:extLst>
+          </p:cNvPr>
+          <p:cNvGrpSpPr/>
+          <p:nvPr/>
+        </p:nvGrpSpPr>
+        <p:grpSpPr>
+          <a:xfrm>
+            <a:off x="3889332" y="403934"/>
+            <a:ext cx="4691043" cy="6297462"/>
+            <a:chOff x="3889332" y="403934"/>
+            <a:chExt cx="4691043" cy="6297462"/>
+          </a:xfrm>
+        </p:grpSpPr>
+        <p:pic>
+          <p:nvPicPr>
+            <p:cNvPr id="5" name="Picture 4" descr="A screenshot of a cell phone&#10;&#10;Description automatically generated">
+              <a:extLst>
+                <a:ext uri="{FF2B5EF4-FFF2-40B4-BE49-F238E27FC236}">
+                  <a16:creationId xmlns:a16="http://schemas.microsoft.com/office/drawing/2014/main" id="{10D1C8E6-2C83-47E6-835F-4A705DADBE89}"/>
+                </a:ext>
+              </a:extLst>
+            </p:cNvPr>
+            <p:cNvPicPr>
+              <a:picLocks noChangeAspect="1"/>
+            </p:cNvPicPr>
+            <p:nvPr/>
+          </p:nvPicPr>
+          <p:blipFill>
+            <a:blip r:embed="rId2">
+              <a:extLst>
+                <a:ext uri="{28A0092B-C50C-407E-A947-70E740481C1C}">
+                  <a14:useLocalDpi xmlns:a14="http://schemas.microsoft.com/office/drawing/2010/main" val="0"/>
+                </a:ext>
+              </a:extLst>
+            </a:blip>
+            <a:stretch>
+              <a:fillRect/>
+            </a:stretch>
+          </p:blipFill>
+          <p:spPr>
+            <a:xfrm>
+              <a:off x="3889332" y="403934"/>
+              <a:ext cx="4003095" cy="6050132"/>
+            </a:xfrm>
+            <a:prstGeom prst="rect">
+              <a:avLst/>
+            </a:prstGeom>
+          </p:spPr>
+        </p:pic>
+        <p:pic>
+          <p:nvPicPr>
+            <p:cNvPr id="6" name="Picture 5" descr="A picture containing drawing&#10;&#10;Description automatically generated">
+              <a:extLst>
+                <a:ext uri="{FF2B5EF4-FFF2-40B4-BE49-F238E27FC236}">
+                  <a16:creationId xmlns:a16="http://schemas.microsoft.com/office/drawing/2014/main" id="{FDAB2456-8CDD-4194-98DF-32B52B0C65E8}"/>
+                </a:ext>
+              </a:extLst>
+            </p:cNvPr>
+            <p:cNvPicPr>
+              <a:picLocks noChangeAspect="1"/>
+            </p:cNvPicPr>
+            <p:nvPr/>
+          </p:nvPicPr>
+          <p:blipFill>
+            <a:blip r:embed="rId3">
+              <a:extLst>
+                <a:ext uri="{28A0092B-C50C-407E-A947-70E740481C1C}">
+                  <a14:useLocalDpi xmlns:a14="http://schemas.microsoft.com/office/drawing/2010/main" val="0"/>
+                </a:ext>
+              </a:extLst>
+            </a:blip>
+            <a:stretch>
+              <a:fillRect/>
+            </a:stretch>
+          </p:blipFill>
+          <p:spPr>
+            <a:xfrm rot="17829045">
+              <a:off x="7204479" y="5325500"/>
+              <a:ext cx="1375896" cy="1375896"/>
+            </a:xfrm>
+            <a:prstGeom prst="rect">
+              <a:avLst/>
+            </a:prstGeom>
+          </p:spPr>
+        </p:pic>
+      </p:grpSp>
+    </p:spTree>
+    <p:extLst>
+      <p:ext uri="{BB962C8B-B14F-4D97-AF65-F5344CB8AC3E}">
+        <p14:creationId xmlns:p14="http://schemas.microsoft.com/office/powerpoint/2010/main" val="4037053186"/>
+      </p:ext>
+    </p:extLst>
+  </p:cSld>
+  <p:clrMapOvr>
+    <a:masterClrMapping/>
+  </p:clrMapOvr>
+</p:sld>
+</file>
+
+<file path=ppt/slides/slide6.xml><?xml version="1.0" encoding="utf-8"?>
+<p:sld xmlns:a="http://schemas.openxmlformats.org/drawingml/2006/main" xmlns:r="http://schemas.openxmlformats.org/officeDocument/2006/relationships" xmlns:p="http://schemas.openxmlformats.org/presentationml/2006/main">
+  <p:cSld>
+    <p:spTree>
+      <p:nvGrpSpPr>
+        <p:cNvPr id="1" name=""/>
+        <p:cNvGrpSpPr/>
+        <p:nvPr/>
+      </p:nvGrpSpPr>
+      <p:grpSpPr>
+        <a:xfrm>
+          <a:off x="0" y="0"/>
+          <a:ext cx="0" cy="0"/>
+          <a:chOff x="0" y="0"/>
+          <a:chExt cx="0" cy="0"/>
+        </a:xfrm>
+      </p:grpSpPr>
+      <p:grpSp>
+        <p:nvGrpSpPr>
+          <p:cNvPr id="7" name="Group 6">
+            <a:extLst>
+              <a:ext uri="{FF2B5EF4-FFF2-40B4-BE49-F238E27FC236}">
+                <a16:creationId xmlns:a16="http://schemas.microsoft.com/office/drawing/2014/main" id="{703FB9D3-3C45-4A21-AB51-1383BF9F8A1B}"/>
+              </a:ext>
+            </a:extLst>
+          </p:cNvPr>
+          <p:cNvGrpSpPr/>
+          <p:nvPr/>
+        </p:nvGrpSpPr>
+        <p:grpSpPr>
+          <a:xfrm>
+            <a:off x="3810993" y="212401"/>
+            <a:ext cx="4249642" cy="6667899"/>
+            <a:chOff x="3810993" y="212401"/>
+            <a:chExt cx="4249642" cy="6667899"/>
+          </a:xfrm>
+        </p:grpSpPr>
+        <p:pic>
+          <p:nvPicPr>
+            <p:cNvPr id="5" name="Picture 4" descr="A picture containing screenshot&#10;&#10;Description automatically generated">
+              <a:extLst>
+                <a:ext uri="{FF2B5EF4-FFF2-40B4-BE49-F238E27FC236}">
+                  <a16:creationId xmlns:a16="http://schemas.microsoft.com/office/drawing/2014/main" id="{39F579D9-4A25-4D3D-88D2-62E08A6812CC}"/>
+                </a:ext>
+              </a:extLst>
+            </p:cNvPr>
+            <p:cNvPicPr>
+              <a:picLocks noChangeAspect="1"/>
+            </p:cNvPicPr>
+            <p:nvPr/>
+          </p:nvPicPr>
+          <p:blipFill>
+            <a:blip r:embed="rId2">
+              <a:extLst>
+                <a:ext uri="{28A0092B-C50C-407E-A947-70E740481C1C}">
+                  <a14:useLocalDpi xmlns:a14="http://schemas.microsoft.com/office/drawing/2010/main" val="0"/>
+                </a:ext>
+              </a:extLst>
+            </a:blip>
+            <a:stretch>
+              <a:fillRect/>
+            </a:stretch>
+          </p:blipFill>
+          <p:spPr>
+            <a:xfrm>
+              <a:off x="3810993" y="212401"/>
+              <a:ext cx="4249642" cy="6433198"/>
+            </a:xfrm>
+            <a:prstGeom prst="rect">
+              <a:avLst/>
+            </a:prstGeom>
+          </p:spPr>
+        </p:pic>
+        <p:pic>
+          <p:nvPicPr>
+            <p:cNvPr id="6" name="Picture 5" descr="A picture containing drawing&#10;&#10;Description automatically generated">
+              <a:extLst>
+                <a:ext uri="{FF2B5EF4-FFF2-40B4-BE49-F238E27FC236}">
+                  <a16:creationId xmlns:a16="http://schemas.microsoft.com/office/drawing/2014/main" id="{8E17FC64-CB88-47A7-9EFF-81957BF7C644}"/>
+                </a:ext>
+              </a:extLst>
+            </p:cNvPr>
+            <p:cNvPicPr>
+              <a:picLocks noChangeAspect="1"/>
+            </p:cNvPicPr>
+            <p:nvPr/>
+          </p:nvPicPr>
+          <p:blipFill>
+            <a:blip r:embed="rId3">
+              <a:extLst>
+                <a:ext uri="{28A0092B-C50C-407E-A947-70E740481C1C}">
+                  <a14:useLocalDpi xmlns:a14="http://schemas.microsoft.com/office/drawing/2010/main" val="0"/>
+                </a:ext>
+              </a:extLst>
+            </a:blip>
+            <a:stretch>
+              <a:fillRect/>
+            </a:stretch>
+          </p:blipFill>
+          <p:spPr>
+            <a:xfrm rot="17829045">
+              <a:off x="4878721" y="5504404"/>
+              <a:ext cx="1375896" cy="1375896"/>
+            </a:xfrm>
+            <a:prstGeom prst="rect">
+              <a:avLst/>
+            </a:prstGeom>
+          </p:spPr>
+        </p:pic>
+      </p:grpSp>
+    </p:spTree>
+    <p:extLst>
+      <p:ext uri="{BB962C8B-B14F-4D97-AF65-F5344CB8AC3E}">
+        <p14:creationId xmlns:p14="http://schemas.microsoft.com/office/powerpoint/2010/main" val="4193854357"/>
+      </p:ext>
+    </p:extLst>
+  </p:cSld>
+  <p:clrMapOvr>
+    <a:masterClrMapping/>
+  </p:clrMapOvr>
+</p:sld>
+</file>
+
+<file path=ppt/slides/slide7.xml><?xml version="1.0" encoding="utf-8"?>
+<p:sld xmlns:a="http://schemas.openxmlformats.org/drawingml/2006/main" xmlns:r="http://schemas.openxmlformats.org/officeDocument/2006/relationships" xmlns:p="http://schemas.openxmlformats.org/presentationml/2006/main">
+  <p:cSld>
+    <p:spTree>
+      <p:nvGrpSpPr>
+        <p:cNvPr id="1" name=""/>
+        <p:cNvGrpSpPr/>
+        <p:nvPr/>
+      </p:nvGrpSpPr>
+      <p:grpSpPr>
+        <a:xfrm>
+          <a:off x="0" y="0"/>
+          <a:ext cx="0" cy="0"/>
+          <a:chOff x="0" y="0"/>
+          <a:chExt cx="0" cy="0"/>
+        </a:xfrm>
+      </p:grpSpPr>
+      <p:grpSp>
+        <p:nvGrpSpPr>
+          <p:cNvPr id="7" name="Group 6">
+            <a:extLst>
+              <a:ext uri="{FF2B5EF4-FFF2-40B4-BE49-F238E27FC236}">
+                <a16:creationId xmlns:a16="http://schemas.microsoft.com/office/drawing/2014/main" id="{13874A58-540E-4ED4-92F4-9AEBC1D7B692}"/>
+              </a:ext>
+            </a:extLst>
+          </p:cNvPr>
+          <p:cNvGrpSpPr/>
+          <p:nvPr/>
+        </p:nvGrpSpPr>
+        <p:grpSpPr>
+          <a:xfrm>
+            <a:off x="3829622" y="0"/>
+            <a:ext cx="4414510" cy="6679096"/>
+            <a:chOff x="3829622" y="0"/>
+            <a:chExt cx="4414510" cy="6679096"/>
+          </a:xfrm>
+        </p:grpSpPr>
+        <p:pic>
+          <p:nvPicPr>
+            <p:cNvPr id="5" name="Picture 4" descr="A screenshot of a cell phone&#10;&#10;Description automatically generated">
+              <a:extLst>
+                <a:ext uri="{FF2B5EF4-FFF2-40B4-BE49-F238E27FC236}">
+                  <a16:creationId xmlns:a16="http://schemas.microsoft.com/office/drawing/2014/main" id="{29BE4370-C684-4CBF-A28F-EE1D414D619B}"/>
+                </a:ext>
+              </a:extLst>
+            </p:cNvPr>
+            <p:cNvPicPr>
+              <a:picLocks noChangeAspect="1"/>
+            </p:cNvPicPr>
+            <p:nvPr/>
+          </p:nvPicPr>
+          <p:blipFill>
+            <a:blip r:embed="rId2">
+              <a:extLst>
+                <a:ext uri="{28A0092B-C50C-407E-A947-70E740481C1C}">
+                  <a14:useLocalDpi xmlns:a14="http://schemas.microsoft.com/office/drawing/2010/main" val="0"/>
+                </a:ext>
+              </a:extLst>
+            </a:blip>
+            <a:stretch>
+              <a:fillRect/>
+            </a:stretch>
+          </p:blipFill>
+          <p:spPr>
+            <a:xfrm>
+              <a:off x="3829622" y="0"/>
+              <a:ext cx="4414510" cy="6679096"/>
+            </a:xfrm>
+            <a:prstGeom prst="rect">
+              <a:avLst/>
+            </a:prstGeom>
+          </p:spPr>
+        </p:pic>
+        <p:pic>
+          <p:nvPicPr>
+            <p:cNvPr id="6" name="Picture 5" descr="A picture containing drawing&#10;&#10;Description automatically generated">
+              <a:extLst>
+                <a:ext uri="{FF2B5EF4-FFF2-40B4-BE49-F238E27FC236}">
+                  <a16:creationId xmlns:a16="http://schemas.microsoft.com/office/drawing/2014/main" id="{5B996CE9-DC9B-4A26-9656-04DF333CDF92}"/>
+                </a:ext>
+              </a:extLst>
+            </p:cNvPr>
+            <p:cNvPicPr>
+              <a:picLocks noChangeAspect="1"/>
+            </p:cNvPicPr>
+            <p:nvPr/>
+          </p:nvPicPr>
+          <p:blipFill>
+            <a:blip r:embed="rId3">
+              <a:extLst>
+                <a:ext uri="{28A0092B-C50C-407E-A947-70E740481C1C}">
+                  <a14:useLocalDpi xmlns:a14="http://schemas.microsoft.com/office/drawing/2010/main" val="0"/>
+                </a:ext>
+              </a:extLst>
+            </a:blip>
+            <a:stretch>
+              <a:fillRect/>
+            </a:stretch>
+          </p:blipFill>
+          <p:spPr>
+            <a:xfrm rot="17829045">
+              <a:off x="4938357" y="4560186"/>
+              <a:ext cx="1375896" cy="1375896"/>
+            </a:xfrm>
+            <a:prstGeom prst="rect">
+              <a:avLst/>
+            </a:prstGeom>
+          </p:spPr>
+        </p:pic>
+      </p:grpSp>
+    </p:spTree>
+    <p:extLst>
+      <p:ext uri="{BB962C8B-B14F-4D97-AF65-F5344CB8AC3E}">
+        <p14:creationId xmlns:p14="http://schemas.microsoft.com/office/powerpoint/2010/main" val="3134058497"/>
+      </p:ext>
+    </p:extLst>
+  </p:cSld>
+  <p:clrMapOvr>
+    <a:masterClrMapping/>
+  </p:clrMapOvr>
+</p:sld>
+</file>
+
+<file path=ppt/slides/slide8.xml><?xml version="1.0" encoding="utf-8"?>
+<p:sld xmlns:a="http://schemas.openxmlformats.org/drawingml/2006/main" xmlns:r="http://schemas.openxmlformats.org/officeDocument/2006/relationships" xmlns:p="http://schemas.openxmlformats.org/presentationml/2006/main">
+  <p:cSld>
+    <p:spTree>
+      <p:nvGrpSpPr>
+        <p:cNvPr id="1" name=""/>
+        <p:cNvGrpSpPr/>
+        <p:nvPr/>
+      </p:nvGrpSpPr>
+      <p:grpSpPr>
+        <a:xfrm>
+          <a:off x="0" y="0"/>
+          <a:ext cx="0" cy="0"/>
+          <a:chOff x="0" y="0"/>
+          <a:chExt cx="0" cy="0"/>
+        </a:xfrm>
+      </p:grpSpPr>
+      <p:pic>
+        <p:nvPicPr>
+          <p:cNvPr id="5" name="Picture 4" descr="A screenshot of a cell phone&#10;&#10;Description automatically generated">
+            <a:extLst>
+              <a:ext uri="{FF2B5EF4-FFF2-40B4-BE49-F238E27FC236}">
+                <a16:creationId xmlns:a16="http://schemas.microsoft.com/office/drawing/2014/main" id="{5602811E-139D-450D-856E-BD10311EDCD9}"/>
+              </a:ext>
+            </a:extLst>
+          </p:cNvPr>
+          <p:cNvPicPr>
+            <a:picLocks noChangeAspect="1"/>
+          </p:cNvPicPr>
+          <p:nvPr/>
+        </p:nvPicPr>
+        <p:blipFill>
+          <a:blip r:embed="rId2">
+            <a:extLst>
+              <a:ext uri="{28A0092B-C50C-407E-A947-70E740481C1C}">
+                <a14:useLocalDpi xmlns:a14="http://schemas.microsoft.com/office/drawing/2010/main" val="0"/>
+              </a:ext>
+            </a:extLst>
+          </a:blip>
+          <a:stretch>
+            <a:fillRect/>
+          </a:stretch>
+        </p:blipFill>
+        <p:spPr>
+          <a:xfrm>
+            <a:off x="3833301" y="112882"/>
+            <a:ext cx="4376421" cy="6632235"/>
+          </a:xfrm>
+          <a:prstGeom prst="rect">
+            <a:avLst/>
+          </a:prstGeom>
+        </p:spPr>
+      </p:pic>
+      <p:pic>
+        <p:nvPicPr>
+          <p:cNvPr id="6" name="Picture 5" descr="A picture containing drawing&#10;&#10;Description automatically generated">
+            <a:extLst>
+              <a:ext uri="{FF2B5EF4-FFF2-40B4-BE49-F238E27FC236}">
+                <a16:creationId xmlns:a16="http://schemas.microsoft.com/office/drawing/2014/main" id="{E5EFCEE7-FE5C-4DE6-A70B-AA5FBA9C895D}"/>
+              </a:ext>
+            </a:extLst>
+          </p:cNvPr>
+          <p:cNvPicPr>
+            <a:picLocks noChangeAspect="1"/>
+          </p:cNvPicPr>
+          <p:nvPr/>
+        </p:nvPicPr>
+        <p:blipFill>
+          <a:blip r:embed="rId3">
+            <a:extLst>
+              <a:ext uri="{28A0092B-C50C-407E-A947-70E740481C1C}">
+                <a14:useLocalDpi xmlns:a14="http://schemas.microsoft.com/office/drawing/2010/main" val="0"/>
+              </a:ext>
+            </a:extLst>
+          </a:blip>
+          <a:stretch>
+            <a:fillRect/>
+          </a:stretch>
+        </p:blipFill>
+        <p:spPr>
+          <a:xfrm rot="17829045">
+            <a:off x="7403261" y="4520429"/>
+            <a:ext cx="1375896" cy="1375896"/>
+          </a:xfrm>
+          <a:prstGeom prst="rect">
+            <a:avLst/>
+          </a:prstGeom>
+        </p:spPr>
+      </p:pic>
+    </p:spTree>
+    <p:extLst>
+      <p:ext uri="{BB962C8B-B14F-4D97-AF65-F5344CB8AC3E}">
+        <p14:creationId xmlns:p14="http://schemas.microsoft.com/office/powerpoint/2010/main" val="1450141572"/>
+      </p:ext>
+    </p:extLst>
+  </p:cSld>
+  <p:clrMapOvr>
+    <a:masterClrMapping/>
+  </p:clrMapOvr>
+</p:sld>
+</file>
+
+<file path=ppt/slides/slide9.xml><?xml version="1.0" encoding="utf-8"?>
 <p:sld xmlns:a="http://schemas.openxmlformats.org/drawingml/2006/main" xmlns:r="http://schemas.openxmlformats.org/officeDocument/2006/relationships" xmlns:p="http://schemas.openxmlformats.org/presentationml/2006/main">
   <p:cSld>
     <p:spTree>
@@ -4653,1479 +6648,6 @@
 </p:sld>
 </file>
 
-<file path=ppt/slides/slide6.xml><?xml version="1.0" encoding="utf-8"?>
-<p:sld xmlns:a="http://schemas.openxmlformats.org/drawingml/2006/main" xmlns:r="http://schemas.openxmlformats.org/officeDocument/2006/relationships" xmlns:p="http://schemas.openxmlformats.org/presentationml/2006/main">
-  <p:cSld>
-    <p:spTree>
-      <p:nvGrpSpPr>
-        <p:cNvPr id="1" name=""/>
-        <p:cNvGrpSpPr/>
-        <p:nvPr/>
-      </p:nvGrpSpPr>
-      <p:grpSpPr>
-        <a:xfrm>
-          <a:off x="0" y="0"/>
-          <a:ext cx="0" cy="0"/>
-          <a:chOff x="0" y="0"/>
-          <a:chExt cx="0" cy="0"/>
-        </a:xfrm>
-      </p:grpSpPr>
-      <p:sp>
-        <p:nvSpPr>
-          <p:cNvPr id="4" name="Rectangle 3">
-            <a:extLst>
-              <a:ext uri="{FF2B5EF4-FFF2-40B4-BE49-F238E27FC236}">
-                <a16:creationId xmlns:a16="http://schemas.microsoft.com/office/drawing/2014/main" id="{9C3054B4-BDFE-4B35-806C-E95E2D5DE5BE}"/>
-              </a:ext>
-            </a:extLst>
-          </p:cNvPr>
-          <p:cNvSpPr/>
-          <p:nvPr/>
-        </p:nvSpPr>
-        <p:spPr>
-          <a:xfrm>
-            <a:off x="905692" y="1759132"/>
-            <a:ext cx="2464526" cy="3814354"/>
-          </a:xfrm>
-          <a:prstGeom prst="rect">
-            <a:avLst/>
-          </a:prstGeom>
-        </p:spPr>
-        <p:style>
-          <a:lnRef idx="2">
-            <a:schemeClr val="accent1">
-              <a:shade val="50000"/>
-            </a:schemeClr>
-          </a:lnRef>
-          <a:fillRef idx="1">
-            <a:schemeClr val="accent1"/>
-          </a:fillRef>
-          <a:effectRef idx="0">
-            <a:schemeClr val="accent1"/>
-          </a:effectRef>
-          <a:fontRef idx="minor">
-            <a:schemeClr val="lt1"/>
-          </a:fontRef>
-        </p:style>
-        <p:txBody>
-          <a:bodyPr rtlCol="0" anchor="ctr"/>
-          <a:lstStyle/>
-          <a:p>
-            <a:pPr algn="ctr"/>
-            <a:endParaRPr lang="en-US"/>
-          </a:p>
-        </p:txBody>
-      </p:sp>
-      <p:sp>
-        <p:nvSpPr>
-          <p:cNvPr id="5" name="Rectangle 4">
-            <a:extLst>
-              <a:ext uri="{FF2B5EF4-FFF2-40B4-BE49-F238E27FC236}">
-                <a16:creationId xmlns:a16="http://schemas.microsoft.com/office/drawing/2014/main" id="{036DA348-1DA5-4888-B490-1790232FE335}"/>
-              </a:ext>
-            </a:extLst>
-          </p:cNvPr>
-          <p:cNvSpPr/>
-          <p:nvPr/>
-        </p:nvSpPr>
-        <p:spPr>
-          <a:xfrm>
-            <a:off x="1654627" y="2131429"/>
-            <a:ext cx="966651" cy="587827"/>
-          </a:xfrm>
-          <a:prstGeom prst="rect">
-            <a:avLst/>
-          </a:prstGeom>
-          <a:solidFill>
-            <a:srgbClr val="00B050"/>
-          </a:solidFill>
-          <a:ln>
-            <a:solidFill>
-              <a:schemeClr val="accent6"/>
-            </a:solidFill>
-          </a:ln>
-        </p:spPr>
-        <p:style>
-          <a:lnRef idx="2">
-            <a:schemeClr val="accent1">
-              <a:shade val="50000"/>
-            </a:schemeClr>
-          </a:lnRef>
-          <a:fillRef idx="1">
-            <a:schemeClr val="accent1"/>
-          </a:fillRef>
-          <a:effectRef idx="0">
-            <a:schemeClr val="accent1"/>
-          </a:effectRef>
-          <a:fontRef idx="minor">
-            <a:schemeClr val="lt1"/>
-          </a:fontRef>
-        </p:style>
-        <p:txBody>
-          <a:bodyPr rtlCol="0" anchor="ctr"/>
-          <a:lstStyle/>
-          <a:p>
-            <a:pPr algn="ctr"/>
-            <a:r>
-              <a:rPr lang="en-US" sz="1600" dirty="0"/>
-              <a:t>TextView </a:t>
-            </a:r>
-          </a:p>
-        </p:txBody>
-      </p:sp>
-      <p:sp>
-        <p:nvSpPr>
-          <p:cNvPr id="8" name="Rectangle 7">
-            <a:extLst>
-              <a:ext uri="{FF2B5EF4-FFF2-40B4-BE49-F238E27FC236}">
-                <a16:creationId xmlns:a16="http://schemas.microsoft.com/office/drawing/2014/main" id="{F633EAA7-8835-48C4-B4E8-1B3E83151D07}"/>
-              </a:ext>
-            </a:extLst>
-          </p:cNvPr>
-          <p:cNvSpPr/>
-          <p:nvPr/>
-        </p:nvSpPr>
-        <p:spPr>
-          <a:xfrm>
-            <a:off x="1589311" y="2908663"/>
-            <a:ext cx="1097281" cy="918754"/>
-          </a:xfrm>
-          <a:prstGeom prst="rect">
-            <a:avLst/>
-          </a:prstGeom>
-          <a:solidFill>
-            <a:srgbClr val="00B050"/>
-          </a:solidFill>
-          <a:ln>
-            <a:solidFill>
-              <a:schemeClr val="accent6"/>
-            </a:solidFill>
-          </a:ln>
-        </p:spPr>
-        <p:style>
-          <a:lnRef idx="2">
-            <a:schemeClr val="accent1">
-              <a:shade val="50000"/>
-            </a:schemeClr>
-          </a:lnRef>
-          <a:fillRef idx="1">
-            <a:schemeClr val="accent1"/>
-          </a:fillRef>
-          <a:effectRef idx="0">
-            <a:schemeClr val="accent1"/>
-          </a:effectRef>
-          <a:fontRef idx="minor">
-            <a:schemeClr val="lt1"/>
-          </a:fontRef>
-        </p:style>
-        <p:txBody>
-          <a:bodyPr rtlCol="0" anchor="ctr"/>
-          <a:lstStyle/>
-          <a:p>
-            <a:pPr algn="ctr"/>
-            <a:r>
-              <a:rPr lang="en-US" sz="1600" dirty="0"/>
-              <a:t>ImageView </a:t>
-            </a:r>
-          </a:p>
-        </p:txBody>
-      </p:sp>
-      <p:sp>
-        <p:nvSpPr>
-          <p:cNvPr id="9" name="Rectangle 8">
-            <a:extLst>
-              <a:ext uri="{FF2B5EF4-FFF2-40B4-BE49-F238E27FC236}">
-                <a16:creationId xmlns:a16="http://schemas.microsoft.com/office/drawing/2014/main" id="{3ADBAAAC-EC0F-4301-A34C-0B4388730C7E}"/>
-              </a:ext>
-            </a:extLst>
-          </p:cNvPr>
-          <p:cNvSpPr/>
-          <p:nvPr/>
-        </p:nvSpPr>
-        <p:spPr>
-          <a:xfrm>
-            <a:off x="1589310" y="3987429"/>
-            <a:ext cx="1097281" cy="622668"/>
-          </a:xfrm>
-          <a:prstGeom prst="rect">
-            <a:avLst/>
-          </a:prstGeom>
-          <a:solidFill>
-            <a:srgbClr val="00B050"/>
-          </a:solidFill>
-          <a:ln>
-            <a:solidFill>
-              <a:schemeClr val="accent6"/>
-            </a:solidFill>
-          </a:ln>
-        </p:spPr>
-        <p:style>
-          <a:lnRef idx="2">
-            <a:schemeClr val="accent1">
-              <a:shade val="50000"/>
-            </a:schemeClr>
-          </a:lnRef>
-          <a:fillRef idx="1">
-            <a:schemeClr val="accent1"/>
-          </a:fillRef>
-          <a:effectRef idx="0">
-            <a:schemeClr val="accent1"/>
-          </a:effectRef>
-          <a:fontRef idx="minor">
-            <a:schemeClr val="lt1"/>
-          </a:fontRef>
-        </p:style>
-        <p:txBody>
-          <a:bodyPr rtlCol="0" anchor="ctr"/>
-          <a:lstStyle/>
-          <a:p>
-            <a:pPr algn="ctr"/>
-            <a:r>
-              <a:rPr lang="en-US" sz="1600" dirty="0"/>
-              <a:t>LoginView </a:t>
-            </a:r>
-          </a:p>
-        </p:txBody>
-      </p:sp>
-      <p:sp>
-        <p:nvSpPr>
-          <p:cNvPr id="10" name="Arrow: Right 9">
-            <a:extLst>
-              <a:ext uri="{FF2B5EF4-FFF2-40B4-BE49-F238E27FC236}">
-                <a16:creationId xmlns:a16="http://schemas.microsoft.com/office/drawing/2014/main" id="{F85A28AB-CB61-45EA-9E29-7E8AD9B2A9CF}"/>
-              </a:ext>
-            </a:extLst>
-          </p:cNvPr>
-          <p:cNvSpPr/>
-          <p:nvPr/>
-        </p:nvSpPr>
-        <p:spPr>
-          <a:xfrm>
-            <a:off x="3564633" y="3342785"/>
-            <a:ext cx="978408" cy="484632"/>
-          </a:xfrm>
-          <a:prstGeom prst="rightArrow">
-            <a:avLst/>
-          </a:prstGeom>
-        </p:spPr>
-        <p:style>
-          <a:lnRef idx="2">
-            <a:schemeClr val="accent1">
-              <a:shade val="50000"/>
-            </a:schemeClr>
-          </a:lnRef>
-          <a:fillRef idx="1">
-            <a:schemeClr val="accent1"/>
-          </a:fillRef>
-          <a:effectRef idx="0">
-            <a:schemeClr val="accent1"/>
-          </a:effectRef>
-          <a:fontRef idx="minor">
-            <a:schemeClr val="lt1"/>
-          </a:fontRef>
-        </p:style>
-        <p:txBody>
-          <a:bodyPr rtlCol="0" anchor="ctr"/>
-          <a:lstStyle/>
-          <a:p>
-            <a:pPr algn="ctr"/>
-            <a:endParaRPr lang="en-US"/>
-          </a:p>
-        </p:txBody>
-      </p:sp>
-      <p:sp>
-        <p:nvSpPr>
-          <p:cNvPr id="11" name="Rectangle 10">
-            <a:extLst>
-              <a:ext uri="{FF2B5EF4-FFF2-40B4-BE49-F238E27FC236}">
-                <a16:creationId xmlns:a16="http://schemas.microsoft.com/office/drawing/2014/main" id="{EE44D4DD-CA49-4C9A-9503-D74ADDE11AC4}"/>
-              </a:ext>
-            </a:extLst>
-          </p:cNvPr>
-          <p:cNvSpPr/>
-          <p:nvPr/>
-        </p:nvSpPr>
-        <p:spPr>
-          <a:xfrm>
-            <a:off x="4754874" y="1759132"/>
-            <a:ext cx="2464526" cy="3814354"/>
-          </a:xfrm>
-          <a:prstGeom prst="rect">
-            <a:avLst/>
-          </a:prstGeom>
-        </p:spPr>
-        <p:style>
-          <a:lnRef idx="2">
-            <a:schemeClr val="accent1">
-              <a:shade val="50000"/>
-            </a:schemeClr>
-          </a:lnRef>
-          <a:fillRef idx="1">
-            <a:schemeClr val="accent1"/>
-          </a:fillRef>
-          <a:effectRef idx="0">
-            <a:schemeClr val="accent1"/>
-          </a:effectRef>
-          <a:fontRef idx="minor">
-            <a:schemeClr val="lt1"/>
-          </a:fontRef>
-        </p:style>
-        <p:txBody>
-          <a:bodyPr rtlCol="0" anchor="ctr"/>
-          <a:lstStyle/>
-          <a:p>
-            <a:pPr algn="ctr"/>
-            <a:endParaRPr lang="en-US"/>
-          </a:p>
-        </p:txBody>
-      </p:sp>
-      <p:sp>
-        <p:nvSpPr>
-          <p:cNvPr id="12" name="Rectangle 11">
-            <a:extLst>
-              <a:ext uri="{FF2B5EF4-FFF2-40B4-BE49-F238E27FC236}">
-                <a16:creationId xmlns:a16="http://schemas.microsoft.com/office/drawing/2014/main" id="{9FF5002A-AE12-41A3-A2CF-F491C350686E}"/>
-              </a:ext>
-            </a:extLst>
-          </p:cNvPr>
-          <p:cNvSpPr/>
-          <p:nvPr/>
-        </p:nvSpPr>
-        <p:spPr>
-          <a:xfrm>
-            <a:off x="5503809" y="2131429"/>
-            <a:ext cx="966651" cy="587827"/>
-          </a:xfrm>
-          <a:prstGeom prst="rect">
-            <a:avLst/>
-          </a:prstGeom>
-          <a:solidFill>
-            <a:srgbClr val="00B050"/>
-          </a:solidFill>
-          <a:ln>
-            <a:solidFill>
-              <a:schemeClr val="accent6"/>
-            </a:solidFill>
-          </a:ln>
-        </p:spPr>
-        <p:style>
-          <a:lnRef idx="2">
-            <a:schemeClr val="accent1">
-              <a:shade val="50000"/>
-            </a:schemeClr>
-          </a:lnRef>
-          <a:fillRef idx="1">
-            <a:schemeClr val="accent1"/>
-          </a:fillRef>
-          <a:effectRef idx="0">
-            <a:schemeClr val="accent1"/>
-          </a:effectRef>
-          <a:fontRef idx="minor">
-            <a:schemeClr val="lt1"/>
-          </a:fontRef>
-        </p:style>
-        <p:txBody>
-          <a:bodyPr rtlCol="0" anchor="ctr"/>
-          <a:lstStyle/>
-          <a:p>
-            <a:pPr algn="ctr"/>
-            <a:r>
-              <a:rPr lang="en-US" sz="1600" dirty="0"/>
-              <a:t>TextView </a:t>
-            </a:r>
-          </a:p>
-        </p:txBody>
-      </p:sp>
-      <p:sp>
-        <p:nvSpPr>
-          <p:cNvPr id="13" name="Rectangle 12">
-            <a:extLst>
-              <a:ext uri="{FF2B5EF4-FFF2-40B4-BE49-F238E27FC236}">
-                <a16:creationId xmlns:a16="http://schemas.microsoft.com/office/drawing/2014/main" id="{E4F764CB-B5CE-4FB6-9F20-29A5569C6D40}"/>
-              </a:ext>
-            </a:extLst>
-          </p:cNvPr>
-          <p:cNvSpPr/>
-          <p:nvPr/>
-        </p:nvSpPr>
-        <p:spPr>
-          <a:xfrm>
-            <a:off x="5438493" y="2908663"/>
-            <a:ext cx="1097281" cy="918754"/>
-          </a:xfrm>
-          <a:prstGeom prst="rect">
-            <a:avLst/>
-          </a:prstGeom>
-          <a:solidFill>
-            <a:srgbClr val="00B050"/>
-          </a:solidFill>
-          <a:ln>
-            <a:solidFill>
-              <a:schemeClr val="accent6"/>
-            </a:solidFill>
-          </a:ln>
-        </p:spPr>
-        <p:style>
-          <a:lnRef idx="2">
-            <a:schemeClr val="accent1">
-              <a:shade val="50000"/>
-            </a:schemeClr>
-          </a:lnRef>
-          <a:fillRef idx="1">
-            <a:schemeClr val="accent1"/>
-          </a:fillRef>
-          <a:effectRef idx="0">
-            <a:schemeClr val="accent1"/>
-          </a:effectRef>
-          <a:fontRef idx="minor">
-            <a:schemeClr val="lt1"/>
-          </a:fontRef>
-        </p:style>
-        <p:txBody>
-          <a:bodyPr rtlCol="0" anchor="ctr"/>
-          <a:lstStyle/>
-          <a:p>
-            <a:pPr algn="ctr"/>
-            <a:r>
-              <a:rPr lang="en-US" sz="1600" dirty="0"/>
-              <a:t>TextView</a:t>
-            </a:r>
-          </a:p>
-          <a:p>
-            <a:pPr algn="ctr"/>
-            <a:r>
-              <a:rPr lang="en-US" sz="1600" dirty="0"/>
-              <a:t>2 </a:t>
-            </a:r>
-          </a:p>
-        </p:txBody>
-      </p:sp>
-      <p:sp>
-        <p:nvSpPr>
-          <p:cNvPr id="14" name="Rectangle 13">
-            <a:extLst>
-              <a:ext uri="{FF2B5EF4-FFF2-40B4-BE49-F238E27FC236}">
-                <a16:creationId xmlns:a16="http://schemas.microsoft.com/office/drawing/2014/main" id="{5F7E93A5-4F9D-4670-91E1-CA9DC5DA0FB2}"/>
-              </a:ext>
-            </a:extLst>
-          </p:cNvPr>
-          <p:cNvSpPr/>
-          <p:nvPr/>
-        </p:nvSpPr>
-        <p:spPr>
-          <a:xfrm>
-            <a:off x="5438493" y="4088669"/>
-            <a:ext cx="1097281" cy="622668"/>
-          </a:xfrm>
-          <a:prstGeom prst="rect">
-            <a:avLst/>
-          </a:prstGeom>
-          <a:solidFill>
-            <a:srgbClr val="00B050"/>
-          </a:solidFill>
-          <a:ln>
-            <a:solidFill>
-              <a:schemeClr val="accent6"/>
-            </a:solidFill>
-          </a:ln>
-        </p:spPr>
-        <p:style>
-          <a:lnRef idx="2">
-            <a:schemeClr val="accent1">
-              <a:shade val="50000"/>
-            </a:schemeClr>
-          </a:lnRef>
-          <a:fillRef idx="1">
-            <a:schemeClr val="accent1"/>
-          </a:fillRef>
-          <a:effectRef idx="0">
-            <a:schemeClr val="accent1"/>
-          </a:effectRef>
-          <a:fontRef idx="minor">
-            <a:schemeClr val="lt1"/>
-          </a:fontRef>
-        </p:style>
-        <p:txBody>
-          <a:bodyPr rtlCol="0" anchor="ctr"/>
-          <a:lstStyle/>
-          <a:p>
-            <a:pPr algn="ctr"/>
-            <a:r>
-              <a:rPr lang="en-US" sz="1600" dirty="0"/>
-              <a:t>Button</a:t>
-            </a:r>
-          </a:p>
-        </p:txBody>
-      </p:sp>
-      <p:sp>
-        <p:nvSpPr>
-          <p:cNvPr id="15" name="Arrow: Right 14">
-            <a:extLst>
-              <a:ext uri="{FF2B5EF4-FFF2-40B4-BE49-F238E27FC236}">
-                <a16:creationId xmlns:a16="http://schemas.microsoft.com/office/drawing/2014/main" id="{8BA0BD86-9D14-4F53-98BE-C77CD29B4138}"/>
-              </a:ext>
-            </a:extLst>
-          </p:cNvPr>
-          <p:cNvSpPr/>
-          <p:nvPr/>
-        </p:nvSpPr>
-        <p:spPr>
-          <a:xfrm>
-            <a:off x="7544450" y="3368040"/>
-            <a:ext cx="978408" cy="484632"/>
-          </a:xfrm>
-          <a:prstGeom prst="rightArrow">
-            <a:avLst/>
-          </a:prstGeom>
-        </p:spPr>
-        <p:style>
-          <a:lnRef idx="2">
-            <a:schemeClr val="accent1">
-              <a:shade val="50000"/>
-            </a:schemeClr>
-          </a:lnRef>
-          <a:fillRef idx="1">
-            <a:schemeClr val="accent1"/>
-          </a:fillRef>
-          <a:effectRef idx="0">
-            <a:schemeClr val="accent1"/>
-          </a:effectRef>
-          <a:fontRef idx="minor">
-            <a:schemeClr val="lt1"/>
-          </a:fontRef>
-        </p:style>
-        <p:txBody>
-          <a:bodyPr rtlCol="0" anchor="ctr"/>
-          <a:lstStyle/>
-          <a:p>
-            <a:pPr algn="ctr"/>
-            <a:endParaRPr lang="en-US"/>
-          </a:p>
-        </p:txBody>
-      </p:sp>
-      <p:sp>
-        <p:nvSpPr>
-          <p:cNvPr id="16" name="Rectangle 15">
-            <a:extLst>
-              <a:ext uri="{FF2B5EF4-FFF2-40B4-BE49-F238E27FC236}">
-                <a16:creationId xmlns:a16="http://schemas.microsoft.com/office/drawing/2014/main" id="{6BA78DE3-CBC8-4A40-92CA-6A971C09D836}"/>
-              </a:ext>
-            </a:extLst>
-          </p:cNvPr>
-          <p:cNvSpPr/>
-          <p:nvPr/>
-        </p:nvSpPr>
-        <p:spPr>
-          <a:xfrm>
-            <a:off x="8786942" y="1759132"/>
-            <a:ext cx="2464526" cy="3814354"/>
-          </a:xfrm>
-          <a:prstGeom prst="rect">
-            <a:avLst/>
-          </a:prstGeom>
-        </p:spPr>
-        <p:style>
-          <a:lnRef idx="2">
-            <a:schemeClr val="accent1">
-              <a:shade val="50000"/>
-            </a:schemeClr>
-          </a:lnRef>
-          <a:fillRef idx="1">
-            <a:schemeClr val="accent1"/>
-          </a:fillRef>
-          <a:effectRef idx="0">
-            <a:schemeClr val="accent1"/>
-          </a:effectRef>
-          <a:fontRef idx="minor">
-            <a:schemeClr val="lt1"/>
-          </a:fontRef>
-        </p:style>
-        <p:txBody>
-          <a:bodyPr rtlCol="0" anchor="ctr"/>
-          <a:lstStyle/>
-          <a:p>
-            <a:pPr algn="ctr"/>
-            <a:endParaRPr lang="en-US"/>
-          </a:p>
-        </p:txBody>
-      </p:sp>
-      <p:sp>
-        <p:nvSpPr>
-          <p:cNvPr id="17" name="Rectangle 16">
-            <a:extLst>
-              <a:ext uri="{FF2B5EF4-FFF2-40B4-BE49-F238E27FC236}">
-                <a16:creationId xmlns:a16="http://schemas.microsoft.com/office/drawing/2014/main" id="{F38BF4A7-E95C-462B-B93A-DAA8D5084050}"/>
-              </a:ext>
-            </a:extLst>
-          </p:cNvPr>
-          <p:cNvSpPr/>
-          <p:nvPr/>
-        </p:nvSpPr>
-        <p:spPr>
-          <a:xfrm>
-            <a:off x="9535877" y="2131429"/>
-            <a:ext cx="966651" cy="587827"/>
-          </a:xfrm>
-          <a:prstGeom prst="rect">
-            <a:avLst/>
-          </a:prstGeom>
-          <a:solidFill>
-            <a:srgbClr val="00B050"/>
-          </a:solidFill>
-          <a:ln>
-            <a:solidFill>
-              <a:schemeClr val="accent6"/>
-            </a:solidFill>
-          </a:ln>
-        </p:spPr>
-        <p:style>
-          <a:lnRef idx="2">
-            <a:schemeClr val="accent1">
-              <a:shade val="50000"/>
-            </a:schemeClr>
-          </a:lnRef>
-          <a:fillRef idx="1">
-            <a:schemeClr val="accent1"/>
-          </a:fillRef>
-          <a:effectRef idx="0">
-            <a:schemeClr val="accent1"/>
-          </a:effectRef>
-          <a:fontRef idx="minor">
-            <a:schemeClr val="lt1"/>
-          </a:fontRef>
-        </p:style>
-        <p:txBody>
-          <a:bodyPr rtlCol="0" anchor="ctr"/>
-          <a:lstStyle/>
-          <a:p>
-            <a:pPr algn="ctr"/>
-            <a:r>
-              <a:rPr lang="en-US" sz="1600" dirty="0"/>
-              <a:t>TextView </a:t>
-            </a:r>
-          </a:p>
-        </p:txBody>
-      </p:sp>
-      <p:sp>
-        <p:nvSpPr>
-          <p:cNvPr id="18" name="Rectangle 17">
-            <a:extLst>
-              <a:ext uri="{FF2B5EF4-FFF2-40B4-BE49-F238E27FC236}">
-                <a16:creationId xmlns:a16="http://schemas.microsoft.com/office/drawing/2014/main" id="{4AA146BA-5B0C-49DD-9D77-C2302277F5C3}"/>
-              </a:ext>
-            </a:extLst>
-          </p:cNvPr>
-          <p:cNvSpPr/>
-          <p:nvPr/>
-        </p:nvSpPr>
-        <p:spPr>
-          <a:xfrm>
-            <a:off x="9470561" y="2908663"/>
-            <a:ext cx="1097281" cy="918754"/>
-          </a:xfrm>
-          <a:prstGeom prst="rect">
-            <a:avLst/>
-          </a:prstGeom>
-          <a:solidFill>
-            <a:srgbClr val="00B050"/>
-          </a:solidFill>
-          <a:ln>
-            <a:solidFill>
-              <a:schemeClr val="accent6"/>
-            </a:solidFill>
-          </a:ln>
-        </p:spPr>
-        <p:style>
-          <a:lnRef idx="2">
-            <a:schemeClr val="accent1">
-              <a:shade val="50000"/>
-            </a:schemeClr>
-          </a:lnRef>
-          <a:fillRef idx="1">
-            <a:schemeClr val="accent1"/>
-          </a:fillRef>
-          <a:effectRef idx="0">
-            <a:schemeClr val="accent1"/>
-          </a:effectRef>
-          <a:fontRef idx="minor">
-            <a:schemeClr val="lt1"/>
-          </a:fontRef>
-        </p:style>
-        <p:txBody>
-          <a:bodyPr rtlCol="0" anchor="ctr"/>
-          <a:lstStyle/>
-          <a:p>
-            <a:pPr algn="ctr"/>
-            <a:r>
-              <a:rPr lang="en-US" sz="1600" dirty="0"/>
-              <a:t>TextView </a:t>
-            </a:r>
-          </a:p>
-          <a:p>
-            <a:pPr algn="ctr"/>
-            <a:r>
-              <a:rPr lang="en-US" sz="1600" dirty="0"/>
-              <a:t>3 </a:t>
-            </a:r>
-          </a:p>
-        </p:txBody>
-      </p:sp>
-      <p:sp>
-        <p:nvSpPr>
-          <p:cNvPr id="19" name="Rectangle 18">
-            <a:extLst>
-              <a:ext uri="{FF2B5EF4-FFF2-40B4-BE49-F238E27FC236}">
-                <a16:creationId xmlns:a16="http://schemas.microsoft.com/office/drawing/2014/main" id="{88CF03C6-AD3E-4D8D-9D25-2F9AAA82DFA8}"/>
-              </a:ext>
-            </a:extLst>
-          </p:cNvPr>
-          <p:cNvSpPr/>
-          <p:nvPr/>
-        </p:nvSpPr>
-        <p:spPr>
-          <a:xfrm>
-            <a:off x="9470561" y="4088669"/>
-            <a:ext cx="1097281" cy="622668"/>
-          </a:xfrm>
-          <a:prstGeom prst="rect">
-            <a:avLst/>
-          </a:prstGeom>
-          <a:solidFill>
-            <a:srgbClr val="00B050"/>
-          </a:solidFill>
-          <a:ln>
-            <a:solidFill>
-              <a:schemeClr val="accent6"/>
-            </a:solidFill>
-          </a:ln>
-        </p:spPr>
-        <p:style>
-          <a:lnRef idx="2">
-            <a:schemeClr val="accent1">
-              <a:shade val="50000"/>
-            </a:schemeClr>
-          </a:lnRef>
-          <a:fillRef idx="1">
-            <a:schemeClr val="accent1"/>
-          </a:fillRef>
-          <a:effectRef idx="0">
-            <a:schemeClr val="accent1"/>
-          </a:effectRef>
-          <a:fontRef idx="minor">
-            <a:schemeClr val="lt1"/>
-          </a:fontRef>
-        </p:style>
-        <p:txBody>
-          <a:bodyPr rtlCol="0" anchor="ctr"/>
-          <a:lstStyle/>
-          <a:p>
-            <a:pPr algn="ctr"/>
-            <a:r>
-              <a:rPr lang="en-US" sz="1600" dirty="0"/>
-              <a:t>ImageView</a:t>
-            </a:r>
-          </a:p>
-        </p:txBody>
-      </p:sp>
-      <p:sp>
-        <p:nvSpPr>
-          <p:cNvPr id="20" name="Rectangle 19">
-            <a:extLst>
-              <a:ext uri="{FF2B5EF4-FFF2-40B4-BE49-F238E27FC236}">
-                <a16:creationId xmlns:a16="http://schemas.microsoft.com/office/drawing/2014/main" id="{6D63E631-AAB0-4DD6-945E-8A2F14FA9BC4}"/>
-              </a:ext>
-            </a:extLst>
-          </p:cNvPr>
-          <p:cNvSpPr/>
-          <p:nvPr/>
-        </p:nvSpPr>
-        <p:spPr>
-          <a:xfrm>
-            <a:off x="1589311" y="4770110"/>
-            <a:ext cx="1097281" cy="622668"/>
-          </a:xfrm>
-          <a:prstGeom prst="rect">
-            <a:avLst/>
-          </a:prstGeom>
-          <a:solidFill>
-            <a:srgbClr val="00B050"/>
-          </a:solidFill>
-          <a:ln>
-            <a:solidFill>
-              <a:schemeClr val="accent6"/>
-            </a:solidFill>
-          </a:ln>
-        </p:spPr>
-        <p:style>
-          <a:lnRef idx="2">
-            <a:schemeClr val="accent1">
-              <a:shade val="50000"/>
-            </a:schemeClr>
-          </a:lnRef>
-          <a:fillRef idx="1">
-            <a:schemeClr val="accent1"/>
-          </a:fillRef>
-          <a:effectRef idx="0">
-            <a:schemeClr val="accent1"/>
-          </a:effectRef>
-          <a:fontRef idx="minor">
-            <a:schemeClr val="lt1"/>
-          </a:fontRef>
-        </p:style>
-        <p:txBody>
-          <a:bodyPr rtlCol="0" anchor="ctr"/>
-          <a:lstStyle/>
-          <a:p>
-            <a:pPr algn="ctr"/>
-            <a:r>
-              <a:rPr lang="en-US" sz="1600" dirty="0"/>
-              <a:t>Button</a:t>
-            </a:r>
-          </a:p>
-        </p:txBody>
-      </p:sp>
-      <p:sp>
-        <p:nvSpPr>
-          <p:cNvPr id="21" name="TextBox 20">
-            <a:extLst>
-              <a:ext uri="{FF2B5EF4-FFF2-40B4-BE49-F238E27FC236}">
-                <a16:creationId xmlns:a16="http://schemas.microsoft.com/office/drawing/2014/main" id="{3191C058-EA50-404C-9583-338B74EEBADA}"/>
-              </a:ext>
-            </a:extLst>
-          </p:cNvPr>
-          <p:cNvSpPr txBox="1"/>
-          <p:nvPr/>
-        </p:nvSpPr>
-        <p:spPr>
-          <a:xfrm>
-            <a:off x="1567784" y="1309794"/>
-            <a:ext cx="1053494" cy="369332"/>
-          </a:xfrm>
-          <a:prstGeom prst="rect">
-            <a:avLst/>
-          </a:prstGeom>
-          <a:noFill/>
-        </p:spPr>
-        <p:txBody>
-          <a:bodyPr wrap="none" rtlCol="0">
-            <a:spAutoFit/>
-          </a:bodyPr>
-          <a:lstStyle/>
-          <a:p>
-            <a:r>
-              <a:rPr lang="en-US" dirty="0"/>
-              <a:t>Activity 1</a:t>
-            </a:r>
-          </a:p>
-        </p:txBody>
-      </p:sp>
-      <p:sp>
-        <p:nvSpPr>
-          <p:cNvPr id="22" name="TextBox 21">
-            <a:extLst>
-              <a:ext uri="{FF2B5EF4-FFF2-40B4-BE49-F238E27FC236}">
-                <a16:creationId xmlns:a16="http://schemas.microsoft.com/office/drawing/2014/main" id="{C065A83E-98A9-45FA-9437-2D2CB04A6656}"/>
-              </a:ext>
-            </a:extLst>
-          </p:cNvPr>
-          <p:cNvSpPr txBox="1"/>
-          <p:nvPr/>
-        </p:nvSpPr>
-        <p:spPr>
-          <a:xfrm>
-            <a:off x="5416966" y="1309794"/>
-            <a:ext cx="1053494" cy="369332"/>
-          </a:xfrm>
-          <a:prstGeom prst="rect">
-            <a:avLst/>
-          </a:prstGeom>
-          <a:noFill/>
-        </p:spPr>
-        <p:txBody>
-          <a:bodyPr wrap="none" rtlCol="0">
-            <a:spAutoFit/>
-          </a:bodyPr>
-          <a:lstStyle/>
-          <a:p>
-            <a:r>
-              <a:rPr lang="en-US" dirty="0"/>
-              <a:t>Activity 2</a:t>
-            </a:r>
-          </a:p>
-        </p:txBody>
-      </p:sp>
-      <p:sp>
-        <p:nvSpPr>
-          <p:cNvPr id="23" name="TextBox 22">
-            <a:extLst>
-              <a:ext uri="{FF2B5EF4-FFF2-40B4-BE49-F238E27FC236}">
-                <a16:creationId xmlns:a16="http://schemas.microsoft.com/office/drawing/2014/main" id="{2A4B5188-4D89-420E-BA29-5B9A8EA86FD2}"/>
-              </a:ext>
-            </a:extLst>
-          </p:cNvPr>
-          <p:cNvSpPr txBox="1"/>
-          <p:nvPr/>
-        </p:nvSpPr>
-        <p:spPr>
-          <a:xfrm>
-            <a:off x="9449034" y="1309794"/>
-            <a:ext cx="1053494" cy="369332"/>
-          </a:xfrm>
-          <a:prstGeom prst="rect">
-            <a:avLst/>
-          </a:prstGeom>
-          <a:noFill/>
-        </p:spPr>
-        <p:txBody>
-          <a:bodyPr wrap="none" rtlCol="0">
-            <a:spAutoFit/>
-          </a:bodyPr>
-          <a:lstStyle/>
-          <a:p>
-            <a:r>
-              <a:rPr lang="en-US" dirty="0"/>
-              <a:t>Activity 3</a:t>
-            </a:r>
-          </a:p>
-        </p:txBody>
-      </p:sp>
-      <p:sp>
-        <p:nvSpPr>
-          <p:cNvPr id="24" name="TextBox 23">
-            <a:extLst>
-              <a:ext uri="{FF2B5EF4-FFF2-40B4-BE49-F238E27FC236}">
-                <a16:creationId xmlns:a16="http://schemas.microsoft.com/office/drawing/2014/main" id="{A3F2EBEC-8EFD-41F5-83BD-EFD8B17025F7}"/>
-              </a:ext>
-            </a:extLst>
-          </p:cNvPr>
-          <p:cNvSpPr txBox="1"/>
-          <p:nvPr/>
-        </p:nvSpPr>
-        <p:spPr>
-          <a:xfrm>
-            <a:off x="3634302" y="2929910"/>
-            <a:ext cx="748603" cy="369332"/>
-          </a:xfrm>
-          <a:prstGeom prst="rect">
-            <a:avLst/>
-          </a:prstGeom>
-          <a:noFill/>
-        </p:spPr>
-        <p:txBody>
-          <a:bodyPr wrap="none" rtlCol="0">
-            <a:spAutoFit/>
-          </a:bodyPr>
-          <a:lstStyle/>
-          <a:p>
-            <a:r>
-              <a:rPr lang="en-US" dirty="0"/>
-              <a:t>Intent</a:t>
-            </a:r>
-          </a:p>
-        </p:txBody>
-      </p:sp>
-      <p:sp>
-        <p:nvSpPr>
-          <p:cNvPr id="25" name="TextBox 24">
-            <a:extLst>
-              <a:ext uri="{FF2B5EF4-FFF2-40B4-BE49-F238E27FC236}">
-                <a16:creationId xmlns:a16="http://schemas.microsoft.com/office/drawing/2014/main" id="{234200F6-6326-4E61-B3DA-6150AAA4472F}"/>
-              </a:ext>
-            </a:extLst>
-          </p:cNvPr>
-          <p:cNvSpPr txBox="1"/>
-          <p:nvPr/>
-        </p:nvSpPr>
-        <p:spPr>
-          <a:xfrm>
-            <a:off x="7628869" y="2929910"/>
-            <a:ext cx="748603" cy="369332"/>
-          </a:xfrm>
-          <a:prstGeom prst="rect">
-            <a:avLst/>
-          </a:prstGeom>
-          <a:noFill/>
-        </p:spPr>
-        <p:txBody>
-          <a:bodyPr wrap="none" rtlCol="0">
-            <a:spAutoFit/>
-          </a:bodyPr>
-          <a:lstStyle/>
-          <a:p>
-            <a:r>
-              <a:rPr lang="en-US" dirty="0"/>
-              <a:t>Intent</a:t>
-            </a:r>
-          </a:p>
-        </p:txBody>
-      </p:sp>
-    </p:spTree>
-    <p:extLst>
-      <p:ext uri="{BB962C8B-B14F-4D97-AF65-F5344CB8AC3E}">
-        <p14:creationId xmlns:p14="http://schemas.microsoft.com/office/powerpoint/2010/main" val="2877618734"/>
-      </p:ext>
-    </p:extLst>
-  </p:cSld>
-  <p:clrMapOvr>
-    <a:masterClrMapping/>
-  </p:clrMapOvr>
-</p:sld>
-</file>
-
-<file path=ppt/slides/slide7.xml><?xml version="1.0" encoding="utf-8"?>
-<p:sld xmlns:a="http://schemas.openxmlformats.org/drawingml/2006/main" xmlns:r="http://schemas.openxmlformats.org/officeDocument/2006/relationships" xmlns:p="http://schemas.openxmlformats.org/presentationml/2006/main">
-  <p:cSld>
-    <p:spTree>
-      <p:nvGrpSpPr>
-        <p:cNvPr id="1" name=""/>
-        <p:cNvGrpSpPr/>
-        <p:nvPr/>
-      </p:nvGrpSpPr>
-      <p:grpSpPr>
-        <a:xfrm>
-          <a:off x="0" y="0"/>
-          <a:ext cx="0" cy="0"/>
-          <a:chOff x="0" y="0"/>
-          <a:chExt cx="0" cy="0"/>
-        </a:xfrm>
-      </p:grpSpPr>
-      <p:sp>
-        <p:nvSpPr>
-          <p:cNvPr id="4" name="Rectangle 3">
-            <a:extLst>
-              <a:ext uri="{FF2B5EF4-FFF2-40B4-BE49-F238E27FC236}">
-                <a16:creationId xmlns:a16="http://schemas.microsoft.com/office/drawing/2014/main" id="{9C3054B4-BDFE-4B35-806C-E95E2D5DE5BE}"/>
-              </a:ext>
-            </a:extLst>
-          </p:cNvPr>
-          <p:cNvSpPr/>
-          <p:nvPr/>
-        </p:nvSpPr>
-        <p:spPr>
-          <a:xfrm>
-            <a:off x="905692" y="1759132"/>
-            <a:ext cx="2464526" cy="3814354"/>
-          </a:xfrm>
-          <a:prstGeom prst="rect">
-            <a:avLst/>
-          </a:prstGeom>
-        </p:spPr>
-        <p:style>
-          <a:lnRef idx="2">
-            <a:schemeClr val="accent1">
-              <a:shade val="50000"/>
-            </a:schemeClr>
-          </a:lnRef>
-          <a:fillRef idx="1">
-            <a:schemeClr val="accent1"/>
-          </a:fillRef>
-          <a:effectRef idx="0">
-            <a:schemeClr val="accent1"/>
-          </a:effectRef>
-          <a:fontRef idx="minor">
-            <a:schemeClr val="lt1"/>
-          </a:fontRef>
-        </p:style>
-        <p:txBody>
-          <a:bodyPr rtlCol="0" anchor="ctr"/>
-          <a:lstStyle/>
-          <a:p>
-            <a:pPr algn="ctr"/>
-            <a:endParaRPr lang="en-US"/>
-          </a:p>
-        </p:txBody>
-      </p:sp>
-      <p:sp>
-        <p:nvSpPr>
-          <p:cNvPr id="8" name="Rectangle 7">
-            <a:extLst>
-              <a:ext uri="{FF2B5EF4-FFF2-40B4-BE49-F238E27FC236}">
-                <a16:creationId xmlns:a16="http://schemas.microsoft.com/office/drawing/2014/main" id="{F633EAA7-8835-48C4-B4E8-1B3E83151D07}"/>
-              </a:ext>
-            </a:extLst>
-          </p:cNvPr>
-          <p:cNvSpPr/>
-          <p:nvPr/>
-        </p:nvSpPr>
-        <p:spPr>
-          <a:xfrm>
-            <a:off x="1589311" y="2908663"/>
-            <a:ext cx="1097281" cy="918754"/>
-          </a:xfrm>
-          <a:prstGeom prst="rect">
-            <a:avLst/>
-          </a:prstGeom>
-          <a:solidFill>
-            <a:srgbClr val="00B050"/>
-          </a:solidFill>
-          <a:ln>
-            <a:solidFill>
-              <a:schemeClr val="accent6"/>
-            </a:solidFill>
-          </a:ln>
-        </p:spPr>
-        <p:style>
-          <a:lnRef idx="2">
-            <a:schemeClr val="accent1">
-              <a:shade val="50000"/>
-            </a:schemeClr>
-          </a:lnRef>
-          <a:fillRef idx="1">
-            <a:schemeClr val="accent1"/>
-          </a:fillRef>
-          <a:effectRef idx="0">
-            <a:schemeClr val="accent1"/>
-          </a:effectRef>
-          <a:fontRef idx="minor">
-            <a:schemeClr val="lt1"/>
-          </a:fontRef>
-        </p:style>
-        <p:txBody>
-          <a:bodyPr rtlCol="0" anchor="ctr"/>
-          <a:lstStyle/>
-          <a:p>
-            <a:pPr algn="ctr"/>
-            <a:r>
-              <a:rPr lang="en-US" sz="1600" dirty="0"/>
-              <a:t>Login Activity</a:t>
-            </a:r>
-          </a:p>
-        </p:txBody>
-      </p:sp>
-      <p:sp>
-        <p:nvSpPr>
-          <p:cNvPr id="10" name="Arrow: Right 9">
-            <a:extLst>
-              <a:ext uri="{FF2B5EF4-FFF2-40B4-BE49-F238E27FC236}">
-                <a16:creationId xmlns:a16="http://schemas.microsoft.com/office/drawing/2014/main" id="{F85A28AB-CB61-45EA-9E29-7E8AD9B2A9CF}"/>
-              </a:ext>
-            </a:extLst>
-          </p:cNvPr>
-          <p:cNvSpPr/>
-          <p:nvPr/>
-        </p:nvSpPr>
-        <p:spPr>
-          <a:xfrm>
-            <a:off x="3564633" y="3342785"/>
-            <a:ext cx="978408" cy="484632"/>
-          </a:xfrm>
-          <a:prstGeom prst="rightArrow">
-            <a:avLst/>
-          </a:prstGeom>
-        </p:spPr>
-        <p:style>
-          <a:lnRef idx="2">
-            <a:schemeClr val="accent1">
-              <a:shade val="50000"/>
-            </a:schemeClr>
-          </a:lnRef>
-          <a:fillRef idx="1">
-            <a:schemeClr val="accent1"/>
-          </a:fillRef>
-          <a:effectRef idx="0">
-            <a:schemeClr val="accent1"/>
-          </a:effectRef>
-          <a:fontRef idx="minor">
-            <a:schemeClr val="lt1"/>
-          </a:fontRef>
-        </p:style>
-        <p:txBody>
-          <a:bodyPr rtlCol="0" anchor="ctr"/>
-          <a:lstStyle/>
-          <a:p>
-            <a:pPr algn="ctr"/>
-            <a:endParaRPr lang="en-US"/>
-          </a:p>
-        </p:txBody>
-      </p:sp>
-      <p:sp>
-        <p:nvSpPr>
-          <p:cNvPr id="11" name="Rectangle 10">
-            <a:extLst>
-              <a:ext uri="{FF2B5EF4-FFF2-40B4-BE49-F238E27FC236}">
-                <a16:creationId xmlns:a16="http://schemas.microsoft.com/office/drawing/2014/main" id="{EE44D4DD-CA49-4C9A-9503-D74ADDE11AC4}"/>
-              </a:ext>
-            </a:extLst>
-          </p:cNvPr>
-          <p:cNvSpPr/>
-          <p:nvPr/>
-        </p:nvSpPr>
-        <p:spPr>
-          <a:xfrm>
-            <a:off x="4754874" y="1759132"/>
-            <a:ext cx="2464526" cy="3814354"/>
-          </a:xfrm>
-          <a:prstGeom prst="rect">
-            <a:avLst/>
-          </a:prstGeom>
-        </p:spPr>
-        <p:style>
-          <a:lnRef idx="2">
-            <a:schemeClr val="accent1">
-              <a:shade val="50000"/>
-            </a:schemeClr>
-          </a:lnRef>
-          <a:fillRef idx="1">
-            <a:schemeClr val="accent1"/>
-          </a:fillRef>
-          <a:effectRef idx="0">
-            <a:schemeClr val="accent1"/>
-          </a:effectRef>
-          <a:fontRef idx="minor">
-            <a:schemeClr val="lt1"/>
-          </a:fontRef>
-        </p:style>
-        <p:txBody>
-          <a:bodyPr rtlCol="0" anchor="ctr"/>
-          <a:lstStyle/>
-          <a:p>
-            <a:pPr algn="ctr"/>
-            <a:endParaRPr lang="en-US"/>
-          </a:p>
-        </p:txBody>
-      </p:sp>
-      <p:sp>
-        <p:nvSpPr>
-          <p:cNvPr id="13" name="Rectangle 12">
-            <a:extLst>
-              <a:ext uri="{FF2B5EF4-FFF2-40B4-BE49-F238E27FC236}">
-                <a16:creationId xmlns:a16="http://schemas.microsoft.com/office/drawing/2014/main" id="{E4F764CB-B5CE-4FB6-9F20-29A5569C6D40}"/>
-              </a:ext>
-            </a:extLst>
-          </p:cNvPr>
-          <p:cNvSpPr/>
-          <p:nvPr/>
-        </p:nvSpPr>
-        <p:spPr>
-          <a:xfrm>
-            <a:off x="5438493" y="2908663"/>
-            <a:ext cx="1097281" cy="918754"/>
-          </a:xfrm>
-          <a:prstGeom prst="rect">
-            <a:avLst/>
-          </a:prstGeom>
-          <a:solidFill>
-            <a:srgbClr val="00B050"/>
-          </a:solidFill>
-          <a:ln>
-            <a:solidFill>
-              <a:schemeClr val="accent6"/>
-            </a:solidFill>
-          </a:ln>
-        </p:spPr>
-        <p:style>
-          <a:lnRef idx="2">
-            <a:schemeClr val="accent1">
-              <a:shade val="50000"/>
-            </a:schemeClr>
-          </a:lnRef>
-          <a:fillRef idx="1">
-            <a:schemeClr val="accent1"/>
-          </a:fillRef>
-          <a:effectRef idx="0">
-            <a:schemeClr val="accent1"/>
-          </a:effectRef>
-          <a:fontRef idx="minor">
-            <a:schemeClr val="lt1"/>
-          </a:fontRef>
-        </p:style>
-        <p:txBody>
-          <a:bodyPr rtlCol="0" anchor="ctr"/>
-          <a:lstStyle/>
-          <a:p>
-            <a:pPr algn="ctr"/>
-            <a:r>
-              <a:rPr lang="en-US" sz="1600" dirty="0"/>
-              <a:t>Home Page Activity </a:t>
-            </a:r>
-          </a:p>
-        </p:txBody>
-      </p:sp>
-      <p:sp>
-        <p:nvSpPr>
-          <p:cNvPr id="24" name="TextBox 23">
-            <a:extLst>
-              <a:ext uri="{FF2B5EF4-FFF2-40B4-BE49-F238E27FC236}">
-                <a16:creationId xmlns:a16="http://schemas.microsoft.com/office/drawing/2014/main" id="{A3F2EBEC-8EFD-41F5-83BD-EFD8B17025F7}"/>
-              </a:ext>
-            </a:extLst>
-          </p:cNvPr>
-          <p:cNvSpPr txBox="1"/>
-          <p:nvPr/>
-        </p:nvSpPr>
-        <p:spPr>
-          <a:xfrm>
-            <a:off x="3634302" y="2929910"/>
-            <a:ext cx="748603" cy="369332"/>
-          </a:xfrm>
-          <a:prstGeom prst="rect">
-            <a:avLst/>
-          </a:prstGeom>
-          <a:noFill/>
-        </p:spPr>
-        <p:txBody>
-          <a:bodyPr wrap="none" rtlCol="0">
-            <a:spAutoFit/>
-          </a:bodyPr>
-          <a:lstStyle/>
-          <a:p>
-            <a:r>
-              <a:rPr lang="en-US" dirty="0"/>
-              <a:t>Intent</a:t>
-            </a:r>
-          </a:p>
-        </p:txBody>
-      </p:sp>
-      <p:sp>
-        <p:nvSpPr>
-          <p:cNvPr id="26" name="Rectangle 25">
-            <a:extLst>
-              <a:ext uri="{FF2B5EF4-FFF2-40B4-BE49-F238E27FC236}">
-                <a16:creationId xmlns:a16="http://schemas.microsoft.com/office/drawing/2014/main" id="{03CEC1F2-00BE-4AAC-AED7-E1D3E01E9B40}"/>
-              </a:ext>
-            </a:extLst>
-          </p:cNvPr>
-          <p:cNvSpPr/>
-          <p:nvPr/>
-        </p:nvSpPr>
-        <p:spPr>
-          <a:xfrm>
-            <a:off x="1589311" y="4289013"/>
-            <a:ext cx="1097281" cy="531561"/>
-          </a:xfrm>
-          <a:prstGeom prst="rect">
-            <a:avLst/>
-          </a:prstGeom>
-          <a:solidFill>
-            <a:srgbClr val="00B050"/>
-          </a:solidFill>
-          <a:ln>
-            <a:solidFill>
-              <a:schemeClr val="accent6"/>
-            </a:solidFill>
-          </a:ln>
-        </p:spPr>
-        <p:style>
-          <a:lnRef idx="2">
-            <a:schemeClr val="accent1">
-              <a:shade val="50000"/>
-            </a:schemeClr>
-          </a:lnRef>
-          <a:fillRef idx="1">
-            <a:schemeClr val="accent1"/>
-          </a:fillRef>
-          <a:effectRef idx="0">
-            <a:schemeClr val="accent1"/>
-          </a:effectRef>
-          <a:fontRef idx="minor">
-            <a:schemeClr val="lt1"/>
-          </a:fontRef>
-        </p:style>
-        <p:txBody>
-          <a:bodyPr rtlCol="0" anchor="ctr"/>
-          <a:lstStyle/>
-          <a:p>
-            <a:pPr algn="ctr"/>
-            <a:r>
-              <a:rPr lang="en-US" sz="1600" dirty="0"/>
-              <a:t>Login Button</a:t>
-            </a:r>
-          </a:p>
-        </p:txBody>
-      </p:sp>
-    </p:spTree>
-    <p:extLst>
-      <p:ext uri="{BB962C8B-B14F-4D97-AF65-F5344CB8AC3E}">
-        <p14:creationId xmlns:p14="http://schemas.microsoft.com/office/powerpoint/2010/main" val="1963087710"/>
-      </p:ext>
-    </p:extLst>
-  </p:cSld>
-  <p:clrMapOvr>
-    <a:masterClrMapping/>
-  </p:clrMapOvr>
-</p:sld>
-</file>
-
-<file path=ppt/slides/slide8.xml><?xml version="1.0" encoding="utf-8"?>
-<p:sld xmlns:a="http://schemas.openxmlformats.org/drawingml/2006/main" xmlns:r="http://schemas.openxmlformats.org/officeDocument/2006/relationships" xmlns:p="http://schemas.openxmlformats.org/presentationml/2006/main">
-  <p:cSld>
-    <p:spTree>
-      <p:nvGrpSpPr>
-        <p:cNvPr id="1" name=""/>
-        <p:cNvGrpSpPr/>
-        <p:nvPr/>
-      </p:nvGrpSpPr>
-      <p:grpSpPr>
-        <a:xfrm>
-          <a:off x="0" y="0"/>
-          <a:ext cx="0" cy="0"/>
-          <a:chOff x="0" y="0"/>
-          <a:chExt cx="0" cy="0"/>
-        </a:xfrm>
-      </p:grpSpPr>
-      <p:sp>
-        <p:nvSpPr>
-          <p:cNvPr id="2" name="Title 1">
-            <a:extLst>
-              <a:ext uri="{FF2B5EF4-FFF2-40B4-BE49-F238E27FC236}">
-                <a16:creationId xmlns:a16="http://schemas.microsoft.com/office/drawing/2014/main" id="{9747B4A0-3316-4B67-8B10-FDBCE8140C80}"/>
-              </a:ext>
-            </a:extLst>
-          </p:cNvPr>
-          <p:cNvSpPr>
-            <a:spLocks noGrp="1"/>
-          </p:cNvSpPr>
-          <p:nvPr>
-            <p:ph type="title"/>
-          </p:nvPr>
-        </p:nvSpPr>
-        <p:spPr/>
-        <p:txBody>
-          <a:bodyPr/>
-          <a:lstStyle/>
-          <a:p>
-            <a:endParaRPr lang="en-US"/>
-          </a:p>
-        </p:txBody>
-      </p:sp>
-      <p:sp>
-        <p:nvSpPr>
-          <p:cNvPr id="3" name="Content Placeholder 2">
-            <a:extLst>
-              <a:ext uri="{FF2B5EF4-FFF2-40B4-BE49-F238E27FC236}">
-                <a16:creationId xmlns:a16="http://schemas.microsoft.com/office/drawing/2014/main" id="{407FC690-692D-4D69-910A-91524847F819}"/>
-              </a:ext>
-            </a:extLst>
-          </p:cNvPr>
-          <p:cNvSpPr>
-            <a:spLocks noGrp="1"/>
-          </p:cNvSpPr>
-          <p:nvPr>
-            <p:ph idx="1"/>
-          </p:nvPr>
-        </p:nvSpPr>
-        <p:spPr/>
-        <p:txBody>
-          <a:bodyPr/>
-          <a:lstStyle/>
-          <a:p>
-            <a:endParaRPr lang="en-US"/>
-          </a:p>
-        </p:txBody>
-      </p:sp>
-    </p:spTree>
-    <p:extLst>
-      <p:ext uri="{BB962C8B-B14F-4D97-AF65-F5344CB8AC3E}">
-        <p14:creationId xmlns:p14="http://schemas.microsoft.com/office/powerpoint/2010/main" val="3134449007"/>
-      </p:ext>
-    </p:extLst>
-  </p:cSld>
-  <p:clrMapOvr>
-    <a:masterClrMapping/>
-  </p:clrMapOvr>
-</p:sld>
-</file>
-
 <file path=ppt/theme/theme1.xml><?xml version="1.0" encoding="utf-8"?>
 <a:theme xmlns:a="http://schemas.openxmlformats.org/drawingml/2006/main" name="Office Theme">
   <a:themeElements>

</xml_diff>